<commit_message>
feat(poster): Update poster according to early feedback
</commit_message>
<xml_diff>
--- a/poster/poster.pptx
+++ b/poster/poster.pptx
@@ -4002,7 +4002,7 @@
         <p:spPr>
           <a:xfrm>
             <a:off x="383325" y="25732247"/>
-            <a:ext cx="7781983" cy="1657762"/>
+            <a:ext cx="7781983" cy="2179571"/>
           </a:xfrm>
           <a:prstGeom prst="rect">
             <a:avLst/>
@@ -4034,12 +4034,18 @@
               <a:buChar char="•"/>
             </a:pPr>
             <a:r>
-              <a:rPr lang="en-GB" sz="3391" dirty="0" err="1"/>
-              <a:t>À</a:t>
-            </a:r>
-            <a:r>
               <a:rPr lang="en-GB" sz="3391" dirty="0"/>
-              <a:t> COMPLÉTER</a:t>
+              <a:t>To other Sequence CRDTs</a:t>
+            </a:r>
+          </a:p>
+          <a:p>
+            <a:pPr marL="1724325" lvl="1" indent="-484518">
+              <a:buFont typeface="Arial" panose="020B0604020202020204" pitchFamily="34" charset="0"/>
+              <a:buChar char="•"/>
+            </a:pPr>
+            <a:r>
+              <a:rPr lang="en-GB" sz="3391" dirty="0"/>
+              <a:t>To other types (Counter, Set, …)</a:t>
             </a:r>
           </a:p>
           <a:p>
@@ -4458,7 +4464,7 @@
             </a:pPr>
             <a:r>
               <a:rPr lang="en-GB" sz="3391" dirty="0"/>
-              <a:t>Designed a </a:t>
+              <a:t>Designed the </a:t>
             </a:r>
             <a:r>
               <a:rPr lang="en-GB" sz="3391" i="1" dirty="0"/>

</xml_diff>

<commit_message>
feat(poster): Add plot on footprint of the data structure
</commit_message>
<xml_diff>
--- a/poster/poster.pptx
+++ b/poster/poster.pptx
@@ -4109,7 +4109,7 @@
         </p:blipFill>
         <p:spPr>
           <a:xfrm>
-            <a:off x="7943667" y="3246991"/>
+            <a:off x="558634" y="6513968"/>
             <a:ext cx="13145127" cy="3303567"/>
           </a:xfrm>
           <a:prstGeom prst="rect">
@@ -4239,7 +4239,7 @@
         </p:nvSpPr>
         <p:spPr>
           <a:xfrm>
-            <a:off x="383341" y="6887168"/>
+            <a:off x="10823714" y="3287732"/>
             <a:ext cx="8746416" cy="744691"/>
           </a:xfrm>
           <a:prstGeom prst="rect">
@@ -4277,7 +4277,7 @@
         </p:nvSpPr>
         <p:spPr>
           <a:xfrm>
-            <a:off x="383341" y="7631859"/>
+            <a:off x="10823714" y="4032423"/>
             <a:ext cx="10233859" cy="1657762"/>
           </a:xfrm>
           <a:prstGeom prst="rect">
@@ -4543,63 +4543,6 @@
       </p:pic>
       <p:sp>
         <p:nvSpPr>
-          <p:cNvPr id="32" name="TextBox 31">
-            <a:extLst>
-              <a:ext uri="{FF2B5EF4-FFF2-40B4-BE49-F238E27FC236}">
-                <a16:creationId xmlns:a16="http://schemas.microsoft.com/office/drawing/2014/main" id="{7ACC3FBA-63FE-5642-84B4-C0F15BE86A16}"/>
-              </a:ext>
-            </a:extLst>
-          </p:cNvPr>
-          <p:cNvSpPr txBox="1"/>
-          <p:nvPr/>
-        </p:nvSpPr>
-        <p:spPr>
-          <a:xfrm>
-            <a:off x="10063459" y="7194036"/>
-            <a:ext cx="10899458" cy="3096745"/>
-          </a:xfrm>
-          <a:prstGeom prst="rect">
-            <a:avLst/>
-          </a:prstGeom>
-          <a:noFill/>
-        </p:spPr>
-        <p:txBody>
-          <a:bodyPr wrap="none" rtlCol="0">
-            <a:spAutoFit/>
-          </a:bodyPr>
-          <a:lstStyle/>
-          <a:p>
-            <a:pPr algn="ctr"/>
-            <a:r>
-              <a:rPr lang="fr-FR" dirty="0"/>
-              <a:t>INSERER GRAPHE ICI</a:t>
-            </a:r>
-          </a:p>
-          <a:p>
-            <a:pPr algn="ctr"/>
-            <a:r>
-              <a:rPr lang="fr-FR" dirty="0"/>
-              <a:t>l’évolution de la taille des éléments </a:t>
-            </a:r>
-          </a:p>
-          <a:p>
-            <a:pPr algn="ctr"/>
-            <a:r>
-              <a:rPr lang="fr-FR" dirty="0"/>
-              <a:t>et de la taille du CRDT</a:t>
-            </a:r>
-          </a:p>
-          <a:p>
-            <a:pPr algn="ctr"/>
-            <a:r>
-              <a:rPr lang="fr-FR" dirty="0"/>
-              <a:t>en fonction du nombre d’éléments insérés</a:t>
-            </a:r>
-          </a:p>
-        </p:txBody>
-      </p:sp>
-      <p:sp>
-        <p:nvSpPr>
           <p:cNvPr id="58" name="ZoneTexte 23">
             <a:extLst>
               <a:ext uri="{FF2B5EF4-FFF2-40B4-BE49-F238E27FC236}">
@@ -5573,6 +5516,36 @@
           </a:p>
         </p:txBody>
       </p:sp>
+      <p:pic>
+        <p:nvPicPr>
+          <p:cNvPr id="3" name="Picture 2">
+            <a:extLst>
+              <a:ext uri="{FF2B5EF4-FFF2-40B4-BE49-F238E27FC236}">
+                <a16:creationId xmlns:a16="http://schemas.microsoft.com/office/drawing/2014/main" id="{B1D9D5DE-748D-9F43-8B56-710D9E023D78}"/>
+              </a:ext>
+            </a:extLst>
+          </p:cNvPr>
+          <p:cNvPicPr>
+            <a:picLocks noChangeAspect="1"/>
+          </p:cNvPicPr>
+          <p:nvPr/>
+        </p:nvPicPr>
+        <p:blipFill>
+          <a:blip r:embed="rId12"/>
+          <a:stretch>
+            <a:fillRect/>
+          </a:stretch>
+        </p:blipFill>
+        <p:spPr>
+          <a:xfrm>
+            <a:off x="14577447" y="6022345"/>
+            <a:ext cx="4979876" cy="4105433"/>
+          </a:xfrm>
+          <a:prstGeom prst="rect">
+            <a:avLst/>
+          </a:prstGeom>
+        </p:spPr>
+      </p:pic>
     </p:spTree>
     <p:extLst>
       <p:ext uri="{BB962C8B-B14F-4D97-AF65-F5344CB8AC3E}">

</xml_diff>

<commit_message>
feat(poster): Rework poster according to feedback
</commit_message>
<xml_diff>
--- a/poster/poster.pptx
+++ b/poster/poster.pptx
@@ -110,12 +110,12 @@
   <p:extLst>
     <p:ext uri="{EFAFB233-063F-42B5-8137-9DF3F51BA10A}">
       <p15:sldGuideLst xmlns:p15="http://schemas.microsoft.com/office/powerpoint/2012/main">
-        <p15:guide id="1" orient="horz" pos="9581" userDrawn="1">
+        <p15:guide id="1" orient="horz" pos="9604" userDrawn="1">
           <p15:clr>
             <a:srgbClr val="A4A3A4"/>
           </p15:clr>
         </p15:guide>
-        <p15:guide id="2" pos="6688" userDrawn="1">
+        <p15:guide id="2" pos="6668" userDrawn="1">
           <p15:clr>
             <a:srgbClr val="A4A3A4"/>
           </p15:clr>
@@ -3421,7 +3421,7 @@
         </p:nvSpPr>
         <p:spPr>
           <a:xfrm>
-            <a:off x="1" y="10594916"/>
+            <a:off x="22303" y="11087282"/>
             <a:ext cx="21388388" cy="775303"/>
           </a:xfrm>
           <a:prstGeom prst="rect">
@@ -3436,7 +3436,7 @@
             <a:noFill/>
           </a:ln>
           <a:effectLst>
-            <a:outerShdw blurRad="1092200" dist="38100" dir="5400000" sx="102000" sy="102000" algn="t" rotWithShape="0">
+            <a:outerShdw blurRad="508000" dist="38100" dir="5400000" algn="t" rotWithShape="0">
               <a:prstClr val="black">
                 <a:alpha val="40000"/>
               </a:prstClr>
@@ -3470,6 +3470,74 @@
       </p:sp>
       <p:sp>
         <p:nvSpPr>
+          <p:cNvPr id="35" name="ZoneTexte 34">
+            <a:extLst>
+              <a:ext uri="{FF2B5EF4-FFF2-40B4-BE49-F238E27FC236}">
+                <a16:creationId xmlns:a16="http://schemas.microsoft.com/office/drawing/2014/main" id="{76D6DB35-8E8A-A349-A69E-AB8CBF07878E}"/>
+              </a:ext>
+            </a:extLst>
+          </p:cNvPr>
+          <p:cNvSpPr txBox="1"/>
+          <p:nvPr/>
+        </p:nvSpPr>
+        <p:spPr>
+          <a:xfrm>
+            <a:off x="-23264" y="11087012"/>
+            <a:ext cx="21388389" cy="777264"/>
+          </a:xfrm>
+          <a:prstGeom prst="rect">
+            <a:avLst/>
+          </a:prstGeom>
+          <a:noFill/>
+        </p:spPr>
+        <p:txBody>
+          <a:bodyPr wrap="square" rtlCol="0">
+            <a:spAutoFit/>
+          </a:bodyPr>
+          <a:lstStyle/>
+          <a:p>
+            <a:pPr algn="ctr"/>
+            <a:r>
+              <a:rPr lang="en-GB" sz="4451" i="1" dirty="0">
+                <a:latin typeface="+mj-lt"/>
+              </a:rPr>
+              <a:t>Reassign shorter identifiers in a fully distributed manner</a:t>
+            </a:r>
+          </a:p>
+        </p:txBody>
+      </p:sp>
+      <p:pic>
+        <p:nvPicPr>
+          <p:cNvPr id="3" name="Picture 2">
+            <a:extLst>
+              <a:ext uri="{FF2B5EF4-FFF2-40B4-BE49-F238E27FC236}">
+                <a16:creationId xmlns:a16="http://schemas.microsoft.com/office/drawing/2014/main" id="{B1D9D5DE-748D-9F43-8B56-710D9E023D78}"/>
+              </a:ext>
+            </a:extLst>
+          </p:cNvPr>
+          <p:cNvPicPr>
+            <a:picLocks noChangeAspect="1"/>
+          </p:cNvPicPr>
+          <p:nvPr/>
+        </p:nvPicPr>
+        <p:blipFill>
+          <a:blip r:embed="rId3"/>
+          <a:stretch>
+            <a:fillRect/>
+          </a:stretch>
+        </p:blipFill>
+        <p:spPr>
+          <a:xfrm>
+            <a:off x="8197389" y="6769459"/>
+            <a:ext cx="5242243" cy="3916079"/>
+          </a:xfrm>
+          <a:prstGeom prst="rect">
+            <a:avLst/>
+          </a:prstGeom>
+        </p:spPr>
+      </p:pic>
+      <p:sp>
+        <p:nvSpPr>
           <p:cNvPr id="20" name="Rectangle 19">
             <a:extLst>
               <a:ext uri="{FF2B5EF4-FFF2-40B4-BE49-F238E27FC236}">
@@ -3497,7 +3565,7 @@
             <a:noFill/>
           </a:ln>
           <a:effectLst>
-            <a:outerShdw blurRad="1092200" dist="38100" dir="5400000" sx="102000" sy="102000" algn="t" rotWithShape="0">
+            <a:outerShdw blurRad="508000" dist="38100" dir="5400000" sx="102000" sy="102000" algn="t" rotWithShape="0">
               <a:prstClr val="black">
                 <a:alpha val="40000"/>
               </a:prstClr>
@@ -3629,7 +3697,7 @@
                     <a:lumMod val="25000"/>
                   </a:schemeClr>
                 </a:solidFill>
-                <a:hlinkClick r:id="rId3"/>
+                <a:hlinkClick r:id="rId4"/>
               </a:rPr>
               <a:t>matthieu.nicolas@inria.fr</a:t>
             </a:r>
@@ -3686,7 +3754,7 @@
           <p:nvPr/>
         </p:nvPicPr>
         <p:blipFill>
-          <a:blip r:embed="rId4"/>
+          <a:blip r:embed="rId5"/>
           <a:stretch>
             <a:fillRect/>
           </a:stretch>
@@ -3716,7 +3784,7 @@
           <p:nvPr/>
         </p:nvPicPr>
         <p:blipFill>
-          <a:blip r:embed="rId5"/>
+          <a:blip r:embed="rId6"/>
           <a:stretch>
             <a:fillRect/>
           </a:stretch>
@@ -3746,10 +3814,10 @@
           <p:nvPr/>
         </p:nvPicPr>
         <p:blipFill rotWithShape="1">
-          <a:blip r:embed="rId6">
+          <a:blip r:embed="rId7">
             <a:extLst>
               <a:ext uri="{96DAC541-7B7A-43D3-8B79-37D633B846F1}">
-                <asvg:svgBlip xmlns:asvg="http://schemas.microsoft.com/office/drawing/2016/SVG/main" r:embed="rId7"/>
+                <asvg:svgBlip xmlns:asvg="http://schemas.microsoft.com/office/drawing/2016/SVG/main" r:embed="rId8"/>
               </a:ext>
             </a:extLst>
           </a:blip>
@@ -3780,8 +3848,8 @@
         </p:nvSpPr>
         <p:spPr>
           <a:xfrm>
-            <a:off x="0" y="10594428"/>
-            <a:ext cx="21388389" cy="744691"/>
+            <a:off x="13741514" y="7319823"/>
+            <a:ext cx="5980783" cy="2049407"/>
           </a:xfrm>
           <a:prstGeom prst="rect">
             <a:avLst/>
@@ -3796,91 +3864,27 @@
           <a:p>
             <a:pPr algn="ctr"/>
             <a:r>
-              <a:rPr lang="en-GB" sz="4239" i="1" dirty="0">
-                <a:solidFill>
-                  <a:schemeClr val="bg2">
-                    <a:lumMod val="25000"/>
-                  </a:schemeClr>
+              <a:rPr lang="en-GB" sz="4239" b="1" dirty="0">
+                <a:solidFill>
+                  <a:srgbClr val="E88103"/>
                 </a:solidFill>
                 <a:latin typeface="Calibri Light" panose="020F0302020204030204" pitchFamily="34" charset="0"/>
                 <a:cs typeface="Calibri Light" panose="020F0302020204030204" pitchFamily="34" charset="0"/>
               </a:rPr>
-              <a:t>How to reduce the overhead introduced by the data structure ?</a:t>
-            </a:r>
-          </a:p>
-        </p:txBody>
-      </p:sp>
-      <p:sp>
-        <p:nvSpPr>
-          <p:cNvPr id="35" name="ZoneTexte 34">
-            <a:extLst>
-              <a:ext uri="{FF2B5EF4-FFF2-40B4-BE49-F238E27FC236}">
-                <a16:creationId xmlns:a16="http://schemas.microsoft.com/office/drawing/2014/main" id="{76D6DB35-8E8A-A349-A69E-AB8CBF07878E}"/>
-              </a:ext>
-            </a:extLst>
-          </p:cNvPr>
-          <p:cNvSpPr txBox="1"/>
-          <p:nvPr/>
-        </p:nvSpPr>
-        <p:spPr>
-          <a:xfrm>
-            <a:off x="-23264" y="11860735"/>
-            <a:ext cx="21388389" cy="777264"/>
-          </a:xfrm>
-          <a:prstGeom prst="rect">
-            <a:avLst/>
-          </a:prstGeom>
-          <a:noFill/>
-        </p:spPr>
-        <p:txBody>
-          <a:bodyPr wrap="square" rtlCol="0">
-            <a:spAutoFit/>
-          </a:bodyPr>
-          <a:lstStyle/>
+              <a:t>How to reduce the overhead introduced</a:t>
+            </a:r>
+          </a:p>
           <a:p>
             <a:pPr algn="ctr"/>
             <a:r>
-              <a:rPr lang="en-GB" sz="4451" b="1" dirty="0">
-                <a:latin typeface="+mj-lt"/>
-              </a:rPr>
-              <a:t>Reassign shorter identifiers in a fully distributed manner</a:t>
-            </a:r>
-          </a:p>
-        </p:txBody>
-      </p:sp>
-      <p:sp>
-        <p:nvSpPr>
-          <p:cNvPr id="54" name="ZoneTexte 53">
-            <a:extLst>
-              <a:ext uri="{FF2B5EF4-FFF2-40B4-BE49-F238E27FC236}">
-                <a16:creationId xmlns:a16="http://schemas.microsoft.com/office/drawing/2014/main" id="{4FB864F3-0E60-8340-B05F-D5AFD9539CAA}"/>
-              </a:ext>
-            </a:extLst>
-          </p:cNvPr>
-          <p:cNvSpPr txBox="1"/>
-          <p:nvPr/>
-        </p:nvSpPr>
-        <p:spPr>
-          <a:xfrm>
-            <a:off x="10823714" y="24953629"/>
-            <a:ext cx="5760094" cy="744691"/>
-          </a:xfrm>
-          <a:prstGeom prst="rect">
-            <a:avLst/>
-          </a:prstGeom>
-          <a:noFill/>
-        </p:spPr>
-        <p:txBody>
-          <a:bodyPr wrap="square" rtlCol="0">
-            <a:spAutoFit/>
-          </a:bodyPr>
-          <a:lstStyle/>
-          <a:p>
-            <a:r>
-              <a:rPr lang="en-GB" sz="4239" dirty="0">
-                <a:latin typeface="+mj-lt"/>
-              </a:rPr>
-              <a:t>References</a:t>
+              <a:rPr lang="en-GB" sz="4239" b="1" dirty="0">
+                <a:solidFill>
+                  <a:srgbClr val="E88103"/>
+                </a:solidFill>
+                <a:latin typeface="Calibri Light" panose="020F0302020204030204" pitchFamily="34" charset="0"/>
+                <a:cs typeface="Calibri Light" panose="020F0302020204030204" pitchFamily="34" charset="0"/>
+              </a:rPr>
+              <a:t>by the data structure ?</a:t>
             </a:r>
           </a:p>
         </p:txBody>
@@ -3899,8 +3903,8 @@
         </p:nvSpPr>
         <p:spPr>
           <a:xfrm>
-            <a:off x="10972" y="21253906"/>
-            <a:ext cx="21388388" cy="3160641"/>
+            <a:off x="10972" y="21353740"/>
+            <a:ext cx="21388388" cy="5030284"/>
           </a:xfrm>
           <a:prstGeom prst="rect">
             <a:avLst/>
@@ -3914,7 +3918,7 @@
             <a:noFill/>
           </a:ln>
           <a:effectLst>
-            <a:outerShdw blurRad="1092200" dist="38100" dir="5400000" sx="102000" sy="102000" algn="t" rotWithShape="0">
+            <a:outerShdw blurRad="508000" dist="38100" dir="5400000" sx="102000" sy="102000" algn="t" rotWithShape="0">
               <a:prstClr val="black">
                 <a:alpha val="40000"/>
               </a:prstClr>
@@ -3950,113 +3954,6 @@
           </a:p>
         </p:txBody>
       </p:sp>
-      <p:sp>
-        <p:nvSpPr>
-          <p:cNvPr id="57" name="ZoneTexte 56">
-            <a:extLst>
-              <a:ext uri="{FF2B5EF4-FFF2-40B4-BE49-F238E27FC236}">
-                <a16:creationId xmlns:a16="http://schemas.microsoft.com/office/drawing/2014/main" id="{D21DD28D-B8AC-B94E-B45A-05F9620A61E3}"/>
-              </a:ext>
-            </a:extLst>
-          </p:cNvPr>
-          <p:cNvSpPr txBox="1"/>
-          <p:nvPr/>
-        </p:nvSpPr>
-        <p:spPr>
-          <a:xfrm>
-            <a:off x="383325" y="24953629"/>
-            <a:ext cx="2696572" cy="799001"/>
-          </a:xfrm>
-          <a:prstGeom prst="rect">
-            <a:avLst/>
-          </a:prstGeom>
-          <a:noFill/>
-        </p:spPr>
-        <p:txBody>
-          <a:bodyPr wrap="none" rtlCol="0">
-            <a:spAutoFit/>
-          </a:bodyPr>
-          <a:lstStyle/>
-          <a:p>
-            <a:r>
-              <a:rPr lang="en-GB" sz="4592" dirty="0">
-                <a:latin typeface="+mj-lt"/>
-              </a:rPr>
-              <a:t>Next Steps</a:t>
-            </a:r>
-          </a:p>
-        </p:txBody>
-      </p:sp>
-      <p:sp>
-        <p:nvSpPr>
-          <p:cNvPr id="15" name="ZoneTexte 14">
-            <a:extLst>
-              <a:ext uri="{FF2B5EF4-FFF2-40B4-BE49-F238E27FC236}">
-                <a16:creationId xmlns:a16="http://schemas.microsoft.com/office/drawing/2014/main" id="{45ADD76B-E0A0-B443-9A6F-A97F1EB3A20D}"/>
-              </a:ext>
-            </a:extLst>
-          </p:cNvPr>
-          <p:cNvSpPr txBox="1"/>
-          <p:nvPr/>
-        </p:nvSpPr>
-        <p:spPr>
-          <a:xfrm>
-            <a:off x="383325" y="25732247"/>
-            <a:ext cx="7781983" cy="2179571"/>
-          </a:xfrm>
-          <a:prstGeom prst="rect">
-            <a:avLst/>
-          </a:prstGeom>
-          <a:noFill/>
-        </p:spPr>
-        <p:txBody>
-          <a:bodyPr wrap="square" rtlCol="0">
-            <a:spAutoFit/>
-          </a:bodyPr>
-          <a:lstStyle/>
-          <a:p>
-            <a:pPr marL="484518" indent="-484518">
-              <a:buFont typeface="Arial" panose="020B0604020202020204" pitchFamily="34" charset="0"/>
-              <a:buChar char="•"/>
-            </a:pPr>
-            <a:r>
-              <a:rPr lang="en-GB" sz="3391" b="1" dirty="0"/>
-              <a:t>Generalize the approach</a:t>
-            </a:r>
-            <a:r>
-              <a:rPr lang="en-GB" sz="3391" dirty="0"/>
-              <a:t> to other CRDTs</a:t>
-            </a:r>
-          </a:p>
-          <a:p>
-            <a:pPr marL="1724325" lvl="1" indent="-484518">
-              <a:buFont typeface="Arial" panose="020B0604020202020204" pitchFamily="34" charset="0"/>
-              <a:buChar char="•"/>
-            </a:pPr>
-            <a:r>
-              <a:rPr lang="en-GB" sz="3391" dirty="0"/>
-              <a:t>To other Sequence CRDTs</a:t>
-            </a:r>
-          </a:p>
-          <a:p>
-            <a:pPr marL="1724325" lvl="1" indent="-484518">
-              <a:buFont typeface="Arial" panose="020B0604020202020204" pitchFamily="34" charset="0"/>
-              <a:buChar char="•"/>
-            </a:pPr>
-            <a:r>
-              <a:rPr lang="en-GB" sz="3391" dirty="0"/>
-              <a:t>To other types (Counter, Set, …)</a:t>
-            </a:r>
-          </a:p>
-          <a:p>
-            <a:pPr marL="1724325" lvl="1" indent="-484518">
-              <a:buFont typeface="Arial" panose="020B0604020202020204" pitchFamily="34" charset="0"/>
-              <a:buChar char="•"/>
-            </a:pPr>
-            <a:endParaRPr lang="en-GB" sz="3391" dirty="0"/>
-          </a:p>
-        </p:txBody>
-      </p:sp>
       <p:pic>
         <p:nvPicPr>
           <p:cNvPr id="26" name="Image 25">
@@ -4072,7 +3969,7 @@
           <p:nvPr/>
         </p:nvPicPr>
         <p:blipFill>
-          <a:blip r:embed="rId8"/>
+          <a:blip r:embed="rId9"/>
           <a:stretch>
             <a:fillRect/>
           </a:stretch>
@@ -4102,15 +3999,15 @@
           <p:nvPr/>
         </p:nvPicPr>
         <p:blipFill>
-          <a:blip r:embed="rId9"/>
+          <a:blip r:embed="rId10"/>
           <a:stretch>
             <a:fillRect/>
           </a:stretch>
         </p:blipFill>
         <p:spPr>
           <a:xfrm>
-            <a:off x="558634" y="6167127"/>
-            <a:ext cx="13145127" cy="3303567"/>
+            <a:off x="7456705" y="3135469"/>
+            <a:ext cx="12265592" cy="3082527"/>
           </a:xfrm>
           <a:prstGeom prst="rect">
             <a:avLst/>
@@ -4131,7 +4028,7 @@
         </p:nvSpPr>
         <p:spPr>
           <a:xfrm>
-            <a:off x="383341" y="3056340"/>
+            <a:off x="649043" y="3081287"/>
             <a:ext cx="8746416" cy="744691"/>
           </a:xfrm>
           <a:prstGeom prst="rect">
@@ -4150,7 +4047,7 @@
                 <a:latin typeface="Calibri Light" panose="020F0302020204030204" pitchFamily="34" charset="0"/>
                 <a:cs typeface="Calibri Light" panose="020F0302020204030204" pitchFamily="34" charset="0"/>
               </a:rPr>
-              <a:t>CRDTs [2]</a:t>
+              <a:t>CRDTs [1]</a:t>
             </a:r>
           </a:p>
         </p:txBody>
@@ -4169,8 +4066,8 @@
         </p:nvSpPr>
         <p:spPr>
           <a:xfrm>
-            <a:off x="383341" y="3797035"/>
-            <a:ext cx="10427566" cy="2179571"/>
+            <a:off x="649043" y="3821982"/>
+            <a:ext cx="6807662" cy="2179571"/>
           </a:xfrm>
           <a:prstGeom prst="rect">
             <a:avLst/>
@@ -4213,15 +4110,8 @@
             </a:r>
             <a:r>
               <a:rPr lang="en-GB" sz="3391" dirty="0"/>
-              <a:t> [2]</a:t>
-            </a:r>
-          </a:p>
-          <a:p>
-            <a:pPr marL="403765" indent="-403765">
-              <a:buFont typeface="Arial" panose="020B0604020202020204" pitchFamily="34" charset="0"/>
-              <a:buChar char="•"/>
-            </a:pPr>
-            <a:endParaRPr lang="en-GB" sz="3391" b="1" dirty="0"/>
+              <a:t> [1]</a:t>
+            </a:r>
           </a:p>
         </p:txBody>
       </p:sp>
@@ -4239,7 +4129,7 @@
         </p:nvSpPr>
         <p:spPr>
           <a:xfrm>
-            <a:off x="10823714" y="3035484"/>
+            <a:off x="698165" y="6906321"/>
             <a:ext cx="8746416" cy="744691"/>
           </a:xfrm>
           <a:prstGeom prst="rect">
@@ -4277,8 +4167,8 @@
         </p:nvSpPr>
         <p:spPr>
           <a:xfrm>
-            <a:off x="10823714" y="3780175"/>
-            <a:ext cx="10233859" cy="1657762"/>
+            <a:off x="698165" y="7651012"/>
+            <a:ext cx="7288779" cy="2179571"/>
           </a:xfrm>
           <a:prstGeom prst="rect">
             <a:avLst/>
@@ -4342,7 +4232,7 @@
                   <a:srgbClr val="E88103"/>
                 </a:solidFill>
               </a:rPr>
-              <a:t> of the data structure </a:t>
+              <a:t> of the data structure</a:t>
             </a:r>
             <a:r>
               <a:rPr lang="en-GB" sz="3391" b="1" dirty="0">
@@ -4350,7 +4240,7 @@
                   <a:srgbClr val="E88103"/>
                 </a:solidFill>
               </a:rPr>
-              <a:t>increasing</a:t>
+              <a:t> increasing</a:t>
             </a:r>
             <a:r>
               <a:rPr lang="en-GB" sz="3391" dirty="0">
@@ -4377,7 +4267,7 @@
         </p:nvSpPr>
         <p:spPr>
           <a:xfrm>
-            <a:off x="2844639" y="21420817"/>
+            <a:off x="2811168" y="21680955"/>
             <a:ext cx="15603911" cy="830997"/>
           </a:xfrm>
           <a:prstGeom prst="rect">
@@ -4414,7 +4304,7 @@
               <a:t> renaming mechanism for </a:t>
             </a:r>
             <a:r>
-              <a:rPr lang="en-GB" sz="4400" b="1" dirty="0" err="1">
+              <a:rPr lang="en-GB" sz="4400" b="1" i="1" dirty="0" err="1">
                 <a:latin typeface="Calibri Light" panose="020F0302020204030204" pitchFamily="34" charset="0"/>
                 <a:cs typeface="Calibri Light" panose="020F0302020204030204" pitchFamily="34" charset="0"/>
               </a:rPr>
@@ -4425,7 +4315,7 @@
                 <a:latin typeface="Calibri Light" panose="020F0302020204030204" pitchFamily="34" charset="0"/>
                 <a:cs typeface="Calibri Light" panose="020F0302020204030204" pitchFamily="34" charset="0"/>
               </a:rPr>
-              <a:t> [1]</a:t>
+              <a:t> [2]</a:t>
             </a:r>
           </a:p>
         </p:txBody>
@@ -4444,8 +4334,8 @@
         </p:nvSpPr>
         <p:spPr>
           <a:xfrm>
-            <a:off x="383340" y="22402254"/>
-            <a:ext cx="10427567" cy="1657762"/>
+            <a:off x="593478" y="23959480"/>
+            <a:ext cx="6264176" cy="1657762"/>
           </a:xfrm>
           <a:prstGeom prst="rect">
             <a:avLst/>
@@ -4485,349 +4375,247 @@
               <a:t>Defined rewriting rules to deal with concurrent updates</a:t>
             </a:r>
           </a:p>
-          <a:p>
-            <a:pPr marL="403765" indent="-403765">
-              <a:buFont typeface="Arial" panose="020B0604020202020204" pitchFamily="34" charset="0"/>
-              <a:buChar char="•"/>
-            </a:pPr>
-            <a:r>
-              <a:rPr lang="en-GB" sz="3391" b="1" dirty="0"/>
-              <a:t>WIP:</a:t>
-            </a:r>
-            <a:r>
-              <a:rPr lang="en-GB" sz="3391" dirty="0"/>
-              <a:t> Implementation in MUTE (</a:t>
-            </a:r>
-            <a:r>
-              <a:rPr lang="en-GB" sz="3391" dirty="0">
-                <a:hlinkClick r:id="rId10"/>
-              </a:rPr>
-              <a:t>https://coedit.re/</a:t>
-            </a:r>
-            <a:r>
-              <a:rPr lang="en-GB" sz="3391" dirty="0"/>
-              <a:t>)</a:t>
-            </a:r>
-          </a:p>
-        </p:txBody>
-      </p:sp>
-      <p:pic>
-        <p:nvPicPr>
-          <p:cNvPr id="29" name="Picture 28">
+        </p:txBody>
+      </p:sp>
+      <p:grpSp>
+        <p:nvGrpSpPr>
+          <p:cNvPr id="23" name="Group 22">
             <a:extLst>
               <a:ext uri="{FF2B5EF4-FFF2-40B4-BE49-F238E27FC236}">
-                <a16:creationId xmlns:a16="http://schemas.microsoft.com/office/drawing/2014/main" id="{62DBB0C7-4C06-B948-B66C-866314E0BFD2}"/>
+                <a16:creationId xmlns:a16="http://schemas.microsoft.com/office/drawing/2014/main" id="{22176B5E-0FB7-654A-B646-DEB6276E1D30}"/>
               </a:ext>
             </a:extLst>
           </p:cNvPr>
-          <p:cNvPicPr>
-            <a:picLocks noChangeAspect="1"/>
-          </p:cNvPicPr>
+          <p:cNvGrpSpPr/>
           <p:nvPr/>
-        </p:nvPicPr>
-        <p:blipFill>
-          <a:blip r:embed="rId11"/>
-          <a:stretch>
-            <a:fillRect/>
-          </a:stretch>
-        </p:blipFill>
-        <p:spPr>
+        </p:nvGrpSpPr>
+        <p:grpSpPr>
           <a:xfrm>
-            <a:off x="1594393" y="15034924"/>
-            <a:ext cx="18104400" cy="3563919"/>
+            <a:off x="10114076" y="12393606"/>
+            <a:ext cx="10370859" cy="1938604"/>
+            <a:chOff x="11139981" y="12977514"/>
+            <a:chExt cx="10427566" cy="1876647"/>
           </a:xfrm>
-          <a:prstGeom prst="rect">
-            <a:avLst/>
-          </a:prstGeom>
-        </p:spPr>
-      </p:pic>
-      <p:sp>
-        <p:nvSpPr>
-          <p:cNvPr id="58" name="ZoneTexte 23">
+        </p:grpSpPr>
+        <p:sp>
+          <p:nvSpPr>
+            <p:cNvPr id="58" name="ZoneTexte 23">
+              <a:extLst>
+                <a:ext uri="{FF2B5EF4-FFF2-40B4-BE49-F238E27FC236}">
+                  <a16:creationId xmlns:a16="http://schemas.microsoft.com/office/drawing/2014/main" id="{BE90886A-EA72-364A-BB3F-C7FF1A2ADF18}"/>
+                </a:ext>
+              </a:extLst>
+            </p:cNvPr>
+            <p:cNvSpPr txBox="1"/>
+            <p:nvPr/>
+          </p:nvSpPr>
+          <p:spPr>
+            <a:xfrm>
+              <a:off x="11139981" y="12977514"/>
+              <a:ext cx="9344954" cy="744691"/>
+            </a:xfrm>
+            <a:prstGeom prst="rect">
+              <a:avLst/>
+            </a:prstGeom>
+            <a:noFill/>
+          </p:spPr>
+          <p:txBody>
+            <a:bodyPr wrap="square" rtlCol="0">
+              <a:spAutoFit/>
+            </a:bodyPr>
+            <a:lstStyle/>
+            <a:p>
+              <a:r>
+                <a:rPr lang="en-GB" sz="4239" i="1" dirty="0">
+                  <a:latin typeface="Calibri Light" panose="020F0302020204030204" pitchFamily="34" charset="0"/>
+                  <a:cs typeface="Calibri Light" panose="020F0302020204030204" pitchFamily="34" charset="0"/>
+                </a:rPr>
+                <a:t>Rename</a:t>
+              </a:r>
+              <a:r>
+                <a:rPr lang="en-GB" sz="4239" dirty="0">
+                  <a:latin typeface="Calibri Light" panose="020F0302020204030204" pitchFamily="34" charset="0"/>
+                  <a:cs typeface="Calibri Light" panose="020F0302020204030204" pitchFamily="34" charset="0"/>
+                </a:rPr>
+                <a:t> operation</a:t>
+              </a:r>
+            </a:p>
+          </p:txBody>
+        </p:sp>
+        <p:sp>
+          <p:nvSpPr>
+            <p:cNvPr id="60" name="ZoneTexte 30">
+              <a:extLst>
+                <a:ext uri="{FF2B5EF4-FFF2-40B4-BE49-F238E27FC236}">
+                  <a16:creationId xmlns:a16="http://schemas.microsoft.com/office/drawing/2014/main" id="{CCD8FFEA-73DD-B94E-B9E5-2ABD0FA75B5F}"/>
+                </a:ext>
+              </a:extLst>
+            </p:cNvPr>
+            <p:cNvSpPr txBox="1"/>
+            <p:nvPr/>
+          </p:nvSpPr>
+          <p:spPr>
+            <a:xfrm>
+              <a:off x="11139981" y="13718209"/>
+              <a:ext cx="10427566" cy="1135952"/>
+            </a:xfrm>
+            <a:prstGeom prst="rect">
+              <a:avLst/>
+            </a:prstGeom>
+            <a:noFill/>
+          </p:spPr>
+          <p:txBody>
+            <a:bodyPr wrap="square" rtlCol="0">
+              <a:spAutoFit/>
+            </a:bodyPr>
+            <a:lstStyle/>
+            <a:p>
+              <a:pPr marL="403765" indent="-403765">
+                <a:buFont typeface="Arial" panose="020B0604020202020204" pitchFamily="34" charset="0"/>
+                <a:buChar char="•"/>
+              </a:pPr>
+              <a:r>
+                <a:rPr lang="en-GB" sz="3391" dirty="0"/>
+                <a:t>Reassign shorter identifiers to whole current state</a:t>
+              </a:r>
+            </a:p>
+            <a:p>
+              <a:pPr marL="403765" indent="-403765">
+                <a:buFont typeface="Arial" panose="020B0604020202020204" pitchFamily="34" charset="0"/>
+                <a:buChar char="•"/>
+              </a:pPr>
+              <a:r>
+                <a:rPr lang="en-GB" sz="3391" dirty="0"/>
+                <a:t>Can be performed without coordination</a:t>
+              </a:r>
+            </a:p>
+          </p:txBody>
+        </p:sp>
+      </p:grpSp>
+      <p:grpSp>
+        <p:nvGrpSpPr>
+          <p:cNvPr id="21" name="Group 20">
             <a:extLst>
               <a:ext uri="{FF2B5EF4-FFF2-40B4-BE49-F238E27FC236}">
-                <a16:creationId xmlns:a16="http://schemas.microsoft.com/office/drawing/2014/main" id="{BE90886A-EA72-364A-BB3F-C7FF1A2ADF18}"/>
+                <a16:creationId xmlns:a16="http://schemas.microsoft.com/office/drawing/2014/main" id="{D0E8435F-4F47-8543-AD5B-8E46DD74097A}"/>
               </a:ext>
             </a:extLst>
           </p:cNvPr>
-          <p:cNvSpPr txBox="1"/>
+          <p:cNvGrpSpPr/>
           <p:nvPr/>
-        </p:nvSpPr>
-        <p:spPr>
+        </p:nvGrpSpPr>
+        <p:grpSpPr>
           <a:xfrm>
-            <a:off x="383341" y="12794466"/>
-            <a:ext cx="8746416" cy="744691"/>
+            <a:off x="10114076" y="15137434"/>
+            <a:ext cx="10393163" cy="1911930"/>
+            <a:chOff x="11139980" y="14901490"/>
+            <a:chExt cx="9365052" cy="1879946"/>
           </a:xfrm>
-          <a:prstGeom prst="rect">
-            <a:avLst/>
-          </a:prstGeom>
-          <a:noFill/>
-        </p:spPr>
-        <p:txBody>
-          <a:bodyPr wrap="square" rtlCol="0">
-            <a:spAutoFit/>
-          </a:bodyPr>
-          <a:lstStyle/>
-          <a:p>
-            <a:r>
-              <a:rPr lang="en-GB" sz="4239" i="1" dirty="0">
-                <a:latin typeface="Calibri Light" panose="020F0302020204030204" pitchFamily="34" charset="0"/>
-                <a:cs typeface="Calibri Light" panose="020F0302020204030204" pitchFamily="34" charset="0"/>
-              </a:rPr>
-              <a:t>Rename</a:t>
-            </a:r>
-            <a:r>
-              <a:rPr lang="en-GB" sz="4239" dirty="0">
-                <a:latin typeface="Calibri Light" panose="020F0302020204030204" pitchFamily="34" charset="0"/>
-                <a:cs typeface="Calibri Light" panose="020F0302020204030204" pitchFamily="34" charset="0"/>
-              </a:rPr>
-              <a:t> operation</a:t>
-            </a:r>
-          </a:p>
-        </p:txBody>
-      </p:sp>
-      <p:sp>
-        <p:nvSpPr>
-          <p:cNvPr id="60" name="ZoneTexte 30">
-            <a:extLst>
-              <a:ext uri="{FF2B5EF4-FFF2-40B4-BE49-F238E27FC236}">
-                <a16:creationId xmlns:a16="http://schemas.microsoft.com/office/drawing/2014/main" id="{CCD8FFEA-73DD-B94E-B9E5-2ABD0FA75B5F}"/>
-              </a:ext>
-            </a:extLst>
-          </p:cNvPr>
-          <p:cNvSpPr txBox="1"/>
-          <p:nvPr/>
-        </p:nvSpPr>
-        <p:spPr>
-          <a:xfrm>
-            <a:off x="383341" y="13535161"/>
-            <a:ext cx="10427566" cy="614142"/>
-          </a:xfrm>
-          <a:prstGeom prst="rect">
-            <a:avLst/>
-          </a:prstGeom>
-          <a:noFill/>
-        </p:spPr>
-        <p:txBody>
-          <a:bodyPr wrap="square" rtlCol="0">
-            <a:spAutoFit/>
-          </a:bodyPr>
-          <a:lstStyle/>
-          <a:p>
-            <a:pPr marL="403765" indent="-403765">
-              <a:buFont typeface="Arial" panose="020B0604020202020204" pitchFamily="34" charset="0"/>
-              <a:buChar char="•"/>
-            </a:pPr>
-            <a:r>
-              <a:rPr lang="en-GB" sz="3391" dirty="0"/>
-              <a:t>Reassign shorter identifiers to whole current state</a:t>
-            </a:r>
-          </a:p>
-        </p:txBody>
-      </p:sp>
-      <p:sp>
-        <p:nvSpPr>
-          <p:cNvPr id="63" name="ZoneTexte 23">
-            <a:extLst>
-              <a:ext uri="{FF2B5EF4-FFF2-40B4-BE49-F238E27FC236}">
-                <a16:creationId xmlns:a16="http://schemas.microsoft.com/office/drawing/2014/main" id="{3A0AB5CF-4A56-BB4F-981D-57F28F83FDE5}"/>
-              </a:ext>
-            </a:extLst>
-          </p:cNvPr>
-          <p:cNvSpPr txBox="1"/>
-          <p:nvPr/>
-        </p:nvSpPr>
-        <p:spPr>
-          <a:xfrm>
-            <a:off x="10810907" y="12794466"/>
-            <a:ext cx="8746416" cy="744691"/>
-          </a:xfrm>
-          <a:prstGeom prst="rect">
-            <a:avLst/>
-          </a:prstGeom>
-          <a:noFill/>
-        </p:spPr>
-        <p:txBody>
-          <a:bodyPr wrap="square" rtlCol="0">
-            <a:spAutoFit/>
-          </a:bodyPr>
-          <a:lstStyle/>
-          <a:p>
-            <a:r>
-              <a:rPr lang="en-GB" sz="4239" dirty="0">
-                <a:latin typeface="Calibri Light" panose="020F0302020204030204" pitchFamily="34" charset="0"/>
-                <a:cs typeface="Calibri Light" panose="020F0302020204030204" pitchFamily="34" charset="0"/>
-              </a:rPr>
-              <a:t>Rewriting rules</a:t>
-            </a:r>
-          </a:p>
-        </p:txBody>
-      </p:sp>
-      <p:sp>
-        <p:nvSpPr>
-          <p:cNvPr id="64" name="ZoneTexte 30">
-            <a:extLst>
-              <a:ext uri="{FF2B5EF4-FFF2-40B4-BE49-F238E27FC236}">
-                <a16:creationId xmlns:a16="http://schemas.microsoft.com/office/drawing/2014/main" id="{5107FF6A-D3CE-2F4F-B306-B04AECD1C8C1}"/>
-              </a:ext>
-            </a:extLst>
-          </p:cNvPr>
-          <p:cNvSpPr txBox="1"/>
-          <p:nvPr/>
-        </p:nvSpPr>
-        <p:spPr>
-          <a:xfrm>
-            <a:off x="10810907" y="13535161"/>
-            <a:ext cx="10427566" cy="1135952"/>
-          </a:xfrm>
-          <a:prstGeom prst="rect">
-            <a:avLst/>
-          </a:prstGeom>
-          <a:noFill/>
-        </p:spPr>
-        <p:txBody>
-          <a:bodyPr wrap="square" rtlCol="0">
-            <a:spAutoFit/>
-          </a:bodyPr>
-          <a:lstStyle/>
-          <a:p>
-            <a:pPr marL="403765" indent="-403765">
-              <a:buFont typeface="Arial" panose="020B0604020202020204" pitchFamily="34" charset="0"/>
-              <a:buChar char="•"/>
-            </a:pPr>
-            <a:r>
-              <a:rPr lang="en-GB" sz="3391" dirty="0"/>
-              <a:t>Concurrent </a:t>
-            </a:r>
-            <a:r>
-              <a:rPr lang="en-GB" sz="3391" i="1" dirty="0"/>
-              <a:t>insert</a:t>
-            </a:r>
-            <a:r>
-              <a:rPr lang="en-GB" sz="3391" dirty="0"/>
-              <a:t> or </a:t>
-            </a:r>
-            <a:r>
-              <a:rPr lang="en-GB" sz="3391" i="1" dirty="0"/>
-              <a:t>delete</a:t>
-            </a:r>
-            <a:r>
-              <a:rPr lang="en-GB" sz="3391" dirty="0"/>
-              <a:t> can not be applied as such</a:t>
-            </a:r>
-          </a:p>
-          <a:p>
-            <a:pPr marL="403765" indent="-403765">
-              <a:buFont typeface="Arial" panose="020B0604020202020204" pitchFamily="34" charset="0"/>
-              <a:buChar char="•"/>
-            </a:pPr>
-            <a:r>
-              <a:rPr lang="en-GB" sz="3391" dirty="0"/>
-              <a:t>Define rewriting rules for concurrent updates</a:t>
-            </a:r>
-          </a:p>
-        </p:txBody>
-      </p:sp>
-      <p:sp>
-        <p:nvSpPr>
-          <p:cNvPr id="65" name="ZoneTexte 23">
-            <a:extLst>
-              <a:ext uri="{FF2B5EF4-FFF2-40B4-BE49-F238E27FC236}">
-                <a16:creationId xmlns:a16="http://schemas.microsoft.com/office/drawing/2014/main" id="{A46BA2E5-D5CD-D64B-BCA6-E17723A2A604}"/>
-              </a:ext>
-            </a:extLst>
-          </p:cNvPr>
-          <p:cNvSpPr txBox="1"/>
-          <p:nvPr/>
-        </p:nvSpPr>
-        <p:spPr>
-          <a:xfrm>
-            <a:off x="6273386" y="18682299"/>
-            <a:ext cx="8746416" cy="744691"/>
-          </a:xfrm>
-          <a:prstGeom prst="rect">
-            <a:avLst/>
-          </a:prstGeom>
-          <a:noFill/>
-        </p:spPr>
-        <p:txBody>
-          <a:bodyPr wrap="square" rtlCol="0">
-            <a:spAutoFit/>
-          </a:bodyPr>
-          <a:lstStyle/>
-          <a:p>
-            <a:pPr algn="ctr"/>
-            <a:r>
-              <a:rPr lang="en-GB" sz="4239" dirty="0">
-                <a:latin typeface="Calibri Light" panose="020F0302020204030204" pitchFamily="34" charset="0"/>
-                <a:cs typeface="Calibri Light" panose="020F0302020204030204" pitchFamily="34" charset="0"/>
-              </a:rPr>
-              <a:t>Concurrent </a:t>
-            </a:r>
-            <a:r>
-              <a:rPr lang="en-GB" sz="4239" i="1" dirty="0">
-                <a:latin typeface="Calibri Light" panose="020F0302020204030204" pitchFamily="34" charset="0"/>
-                <a:cs typeface="Calibri Light" panose="020F0302020204030204" pitchFamily="34" charset="0"/>
-              </a:rPr>
-              <a:t>rename</a:t>
-            </a:r>
-            <a:r>
-              <a:rPr lang="en-GB" sz="4239" dirty="0">
-                <a:latin typeface="Calibri Light" panose="020F0302020204030204" pitchFamily="34" charset="0"/>
-                <a:cs typeface="Calibri Light" panose="020F0302020204030204" pitchFamily="34" charset="0"/>
-              </a:rPr>
-              <a:t> operations</a:t>
-            </a:r>
-          </a:p>
-        </p:txBody>
-      </p:sp>
-      <p:sp>
-        <p:nvSpPr>
-          <p:cNvPr id="67" name="ZoneTexte 30">
-            <a:extLst>
-              <a:ext uri="{FF2B5EF4-FFF2-40B4-BE49-F238E27FC236}">
-                <a16:creationId xmlns:a16="http://schemas.microsoft.com/office/drawing/2014/main" id="{D3EF0644-01D8-EF49-8E02-40346786C7CF}"/>
-              </a:ext>
-            </a:extLst>
-          </p:cNvPr>
-          <p:cNvSpPr txBox="1"/>
-          <p:nvPr/>
-        </p:nvSpPr>
-        <p:spPr>
-          <a:xfrm>
-            <a:off x="383325" y="19532143"/>
-            <a:ext cx="9786571" cy="614142"/>
-          </a:xfrm>
-          <a:prstGeom prst="rect">
-            <a:avLst/>
-          </a:prstGeom>
-          <a:noFill/>
-        </p:spPr>
-        <p:txBody>
-          <a:bodyPr wrap="square" numCol="1" rtlCol="0">
-            <a:spAutoFit/>
-          </a:bodyPr>
-          <a:lstStyle/>
-          <a:p>
-            <a:pPr marL="403765" indent="-403765">
-              <a:buFont typeface="Arial" panose="020B0604020202020204" pitchFamily="34" charset="0"/>
-              <a:buChar char="•"/>
-            </a:pPr>
-            <a:r>
-              <a:rPr lang="en-GB" sz="3391" dirty="0"/>
-              <a:t>Define a total order on</a:t>
-            </a:r>
-            <a:r>
-              <a:rPr lang="en-GB" sz="3391" i="1" dirty="0"/>
-              <a:t> rename</a:t>
-            </a:r>
-            <a:r>
-              <a:rPr lang="en-GB" sz="3391" dirty="0"/>
-              <a:t> operations</a:t>
-            </a:r>
-          </a:p>
-        </p:txBody>
-      </p:sp>
+        </p:grpSpPr>
+        <p:sp>
+          <p:nvSpPr>
+            <p:cNvPr id="63" name="ZoneTexte 23">
+              <a:extLst>
+                <a:ext uri="{FF2B5EF4-FFF2-40B4-BE49-F238E27FC236}">
+                  <a16:creationId xmlns:a16="http://schemas.microsoft.com/office/drawing/2014/main" id="{3A0AB5CF-4A56-BB4F-981D-57F28F83FDE5}"/>
+                </a:ext>
+              </a:extLst>
+            </p:cNvPr>
+            <p:cNvSpPr txBox="1"/>
+            <p:nvPr/>
+          </p:nvSpPr>
+          <p:spPr>
+            <a:xfrm>
+              <a:off x="11139980" y="14901490"/>
+              <a:ext cx="9344955" cy="744691"/>
+            </a:xfrm>
+            <a:prstGeom prst="rect">
+              <a:avLst/>
+            </a:prstGeom>
+            <a:noFill/>
+          </p:spPr>
+          <p:txBody>
+            <a:bodyPr wrap="square" rtlCol="0">
+              <a:spAutoFit/>
+            </a:bodyPr>
+            <a:lstStyle/>
+            <a:p>
+              <a:r>
+                <a:rPr lang="en-GB" sz="4239" dirty="0">
+                  <a:latin typeface="Calibri Light" panose="020F0302020204030204" pitchFamily="34" charset="0"/>
+                  <a:cs typeface="Calibri Light" panose="020F0302020204030204" pitchFamily="34" charset="0"/>
+                </a:rPr>
+                <a:t>Rewriting rules</a:t>
+              </a:r>
+            </a:p>
+          </p:txBody>
+        </p:sp>
+        <p:sp>
+          <p:nvSpPr>
+            <p:cNvPr id="64" name="ZoneTexte 30">
+              <a:extLst>
+                <a:ext uri="{FF2B5EF4-FFF2-40B4-BE49-F238E27FC236}">
+                  <a16:creationId xmlns:a16="http://schemas.microsoft.com/office/drawing/2014/main" id="{5107FF6A-D3CE-2F4F-B306-B04AECD1C8C1}"/>
+                </a:ext>
+              </a:extLst>
+            </p:cNvPr>
+            <p:cNvSpPr txBox="1"/>
+            <p:nvPr/>
+          </p:nvSpPr>
+          <p:spPr>
+            <a:xfrm>
+              <a:off x="11160077" y="15664487"/>
+              <a:ext cx="9344955" cy="1116949"/>
+            </a:xfrm>
+            <a:prstGeom prst="rect">
+              <a:avLst/>
+            </a:prstGeom>
+            <a:noFill/>
+          </p:spPr>
+          <p:txBody>
+            <a:bodyPr wrap="square" rtlCol="0">
+              <a:spAutoFit/>
+            </a:bodyPr>
+            <a:lstStyle/>
+            <a:p>
+              <a:pPr marL="403765" indent="-403765">
+                <a:buFont typeface="Arial" panose="020B0604020202020204" pitchFamily="34" charset="0"/>
+                <a:buChar char="•"/>
+              </a:pPr>
+              <a:r>
+                <a:rPr lang="en-GB" sz="3391" dirty="0"/>
+                <a:t>Can not apply concurrent </a:t>
+              </a:r>
+              <a:r>
+                <a:rPr lang="en-GB" sz="3391" i="1" dirty="0"/>
+                <a:t>insert</a:t>
+              </a:r>
+              <a:r>
+                <a:rPr lang="en-GB" sz="3391" dirty="0"/>
+                <a:t> or </a:t>
+              </a:r>
+              <a:r>
+                <a:rPr lang="en-GB" sz="3391" i="1" dirty="0"/>
+                <a:t>delete</a:t>
+              </a:r>
+              <a:r>
+                <a:rPr lang="en-GB" sz="3391" dirty="0"/>
+                <a:t> as such</a:t>
+              </a:r>
+            </a:p>
+            <a:p>
+              <a:pPr marL="403765" indent="-403765">
+                <a:buFont typeface="Arial" panose="020B0604020202020204" pitchFamily="34" charset="0"/>
+                <a:buChar char="•"/>
+              </a:pPr>
+              <a:r>
+                <a:rPr lang="en-GB" sz="3391" dirty="0"/>
+                <a:t>Define rewriting rules to handle concurrent updates</a:t>
+              </a:r>
+            </a:p>
+          </p:txBody>
+        </p:sp>
+      </p:grpSp>
       <p:sp>
         <p:nvSpPr>
           <p:cNvPr id="74" name="ZoneTexte 3">
@@ -4842,7 +4630,7 @@
         </p:nvSpPr>
         <p:spPr>
           <a:xfrm>
-            <a:off x="41582" y="1034239"/>
+            <a:off x="41582" y="1070333"/>
             <a:ext cx="21305227" cy="830997"/>
           </a:xfrm>
           <a:prstGeom prst="rect">
@@ -4917,15 +4705,15 @@
         </p:nvSpPr>
         <p:spPr>
           <a:xfrm>
-            <a:off x="10823714" y="25732247"/>
-            <a:ext cx="10265079" cy="3222421"/>
+            <a:off x="432463" y="26901885"/>
+            <a:ext cx="10189500" cy="1483483"/>
           </a:xfrm>
           <a:prstGeom prst="rect">
             <a:avLst/>
           </a:prstGeom>
         </p:spPr>
         <p:txBody>
-          <a:bodyPr wrap="square">
+          <a:bodyPr wrap="square" numCol="1">
             <a:spAutoFit/>
           </a:bodyPr>
           <a:lstStyle/>
@@ -4938,7 +4726,7 @@
                   </a:schemeClr>
                 </a:solidFill>
               </a:rPr>
-              <a:t>[1] L. André, S. Martin, G. </a:t>
+              <a:t>[1] M. Shapiro, N. M. </a:t>
             </a:r>
             <a:r>
               <a:rPr lang="fr-FR" sz="2260" dirty="0" err="1">
@@ -4948,7 +4736,7 @@
                   </a:schemeClr>
                 </a:solidFill>
               </a:rPr>
-              <a:t>Oster</a:t>
+              <a:t>Preguiça</a:t>
             </a:r>
             <a:r>
               <a:rPr lang="fr-FR" sz="2260" dirty="0">
@@ -4958,50 +4746,50 @@
                   </a:schemeClr>
                 </a:solidFill>
               </a:rPr>
-              <a:t>, and C.-L. Ignat.</a:t>
-            </a:r>
-          </a:p>
-          <a:p>
-            <a:r>
-              <a:rPr lang="fr-FR" sz="2260" i="1" dirty="0" err="1">
+              <a:t>, C. </a:t>
+            </a:r>
+            <a:r>
+              <a:rPr lang="fr-FR" sz="2260" dirty="0" err="1">
                 <a:solidFill>
                   <a:schemeClr val="bg2">
                     <a:lumMod val="50000"/>
                   </a:schemeClr>
                 </a:solidFill>
               </a:rPr>
-              <a:t>Supporting</a:t>
-            </a:r>
-            <a:r>
-              <a:rPr lang="fr-FR" sz="2260" i="1" dirty="0">
+              <a:t>Baquero</a:t>
+            </a:r>
+            <a:r>
+              <a:rPr lang="fr-FR" sz="2260" dirty="0">
                 <a:solidFill>
                   <a:schemeClr val="bg2">
                     <a:lumMod val="50000"/>
                   </a:schemeClr>
                 </a:solidFill>
               </a:rPr>
-              <a:t> adaptable </a:t>
-            </a:r>
-            <a:r>
-              <a:rPr lang="fr-FR" sz="2260" i="1" dirty="0" err="1">
+              <a:t>, and M. </a:t>
+            </a:r>
+            <a:r>
+              <a:rPr lang="fr-FR" sz="2260" dirty="0" err="1">
                 <a:solidFill>
                   <a:schemeClr val="bg2">
                     <a:lumMod val="50000"/>
                   </a:schemeClr>
                 </a:solidFill>
               </a:rPr>
-              <a:t>granularity</a:t>
-            </a:r>
-            <a:r>
-              <a:rPr lang="fr-FR" sz="2260" i="1" dirty="0">
+              <a:t>Zawirski</a:t>
+            </a:r>
+            <a:r>
+              <a:rPr lang="fr-FR" sz="2260" dirty="0">
                 <a:solidFill>
                   <a:schemeClr val="bg2">
                     <a:lumMod val="50000"/>
                   </a:schemeClr>
                 </a:solidFill>
               </a:rPr>
-              <a:t> of changes for massive-</a:t>
-            </a:r>
+              <a:t>. </a:t>
+            </a:r>
+          </a:p>
+          <a:p>
             <a:r>
               <a:rPr lang="fr-FR" sz="2260" i="1" dirty="0" err="1">
                 <a:solidFill>
@@ -5010,7 +4798,7 @@
                   </a:schemeClr>
                 </a:solidFill>
               </a:rPr>
-              <a:t>scale</a:t>
+              <a:t>Conflict</a:t>
             </a:r>
             <a:r>
               <a:rPr lang="fr-FR" sz="2260" i="1" dirty="0">
@@ -5020,7 +4808,7 @@
                   </a:schemeClr>
                 </a:solidFill>
               </a:rPr>
-              <a:t> collaborative </a:t>
+              <a:t>-free </a:t>
             </a:r>
             <a:r>
               <a:rPr lang="fr-FR" sz="2260" i="1" dirty="0" err="1">
@@ -5030,17 +4818,17 @@
                   </a:schemeClr>
                 </a:solidFill>
               </a:rPr>
-              <a:t>editing</a:t>
-            </a:r>
-            <a:r>
-              <a:rPr lang="fr-FR" sz="2260" dirty="0">
+              <a:t>replicated</a:t>
+            </a:r>
+            <a:r>
+              <a:rPr lang="fr-FR" sz="2260" i="1" dirty="0">
                 <a:solidFill>
                   <a:schemeClr val="bg2">
                     <a:lumMod val="50000"/>
                   </a:schemeClr>
                 </a:solidFill>
               </a:rPr>
-              <a:t>.</a:t>
+              <a:t> data types.</a:t>
             </a:r>
           </a:p>
           <a:p>
@@ -5055,94 +4843,94 @@
               <a:t>In </a:t>
             </a:r>
             <a:r>
-              <a:rPr lang="fr-FR" sz="2260" i="1" dirty="0">
+              <a:rPr lang="fr-FR" sz="2260" i="1" dirty="0" err="1">
                 <a:solidFill>
                   <a:schemeClr val="bg2">
                     <a:lumMod val="50000"/>
                   </a:schemeClr>
                 </a:solidFill>
               </a:rPr>
-              <a:t>International </a:t>
-            </a:r>
-            <a:r>
-              <a:rPr lang="fr-FR" sz="2260" i="1" dirty="0" err="1">
+              <a:t>Proceedings</a:t>
+            </a:r>
+            <a:r>
+              <a:rPr lang="fr-FR" sz="2260" i="1" dirty="0">
                 <a:solidFill>
                   <a:schemeClr val="bg2">
                     <a:lumMod val="50000"/>
                   </a:schemeClr>
                 </a:solidFill>
               </a:rPr>
-              <a:t>Conference</a:t>
-            </a:r>
-            <a:r>
-              <a:rPr lang="fr-FR" sz="2260" i="1" dirty="0">
+              <a:t> of the 13th International Symposium on </a:t>
+            </a:r>
+            <a:r>
+              <a:rPr lang="fr-FR" sz="2260" i="1" dirty="0" err="1">
                 <a:solidFill>
                   <a:schemeClr val="bg2">
                     <a:lumMod val="50000"/>
                   </a:schemeClr>
                 </a:solidFill>
               </a:rPr>
-              <a:t> on Collaborative </a:t>
-            </a:r>
-            <a:r>
-              <a:rPr lang="fr-FR" sz="2260" i="1" dirty="0" err="1">
+              <a:t>Stabilization</a:t>
+            </a:r>
+            <a:r>
+              <a:rPr lang="fr-FR" sz="2260" i="1" dirty="0">
                 <a:solidFill>
                   <a:schemeClr val="bg2">
                     <a:lumMod val="50000"/>
                   </a:schemeClr>
                 </a:solidFill>
               </a:rPr>
-              <a:t>Computing</a:t>
-            </a:r>
-            <a:r>
-              <a:rPr lang="fr-FR" sz="2260" i="1" dirty="0">
+              <a:t>, </a:t>
+            </a:r>
+            <a:r>
+              <a:rPr lang="fr-FR" sz="2260" i="1" dirty="0" err="1">
                 <a:solidFill>
                   <a:schemeClr val="bg2">
                     <a:lumMod val="50000"/>
                   </a:schemeClr>
                 </a:solidFill>
               </a:rPr>
-              <a:t>: Networking, Applications and </a:t>
-            </a:r>
-            <a:r>
-              <a:rPr lang="fr-FR" sz="2260" i="1" dirty="0" err="1">
+              <a:t>Safety</a:t>
+            </a:r>
+            <a:r>
+              <a:rPr lang="fr-FR" sz="2260" i="1" dirty="0">
                 <a:solidFill>
                   <a:schemeClr val="bg2">
                     <a:lumMod val="50000"/>
                   </a:schemeClr>
                 </a:solidFill>
               </a:rPr>
-              <a:t>Worksharing</a:t>
-            </a:r>
-            <a:r>
-              <a:rPr lang="fr-FR" sz="2260" i="1" dirty="0">
+              <a:t>, and Security of </a:t>
+            </a:r>
+            <a:r>
+              <a:rPr lang="fr-FR" sz="2260" i="1" dirty="0" err="1">
                 <a:solidFill>
                   <a:schemeClr val="bg2">
                     <a:lumMod val="50000"/>
                   </a:schemeClr>
                 </a:solidFill>
               </a:rPr>
-              <a:t> - </a:t>
-            </a:r>
-            <a:r>
-              <a:rPr lang="fr-FR" sz="2260" i="1" dirty="0" err="1">
+              <a:t>Distributed</a:t>
+            </a:r>
+            <a:r>
+              <a:rPr lang="fr-FR" sz="2260" i="1" dirty="0">
                 <a:solidFill>
                   <a:schemeClr val="bg2">
                     <a:lumMod val="50000"/>
                   </a:schemeClr>
                 </a:solidFill>
               </a:rPr>
-              <a:t>CollaborateCom</a:t>
-            </a:r>
-            <a:r>
-              <a:rPr lang="fr-FR" sz="2260" i="1" dirty="0">
+              <a:t> </a:t>
+            </a:r>
+            <a:r>
+              <a:rPr lang="fr-FR" sz="2260" i="1" dirty="0" err="1">
                 <a:solidFill>
                   <a:schemeClr val="bg2">
                     <a:lumMod val="50000"/>
                   </a:schemeClr>
                 </a:solidFill>
               </a:rPr>
-              <a:t> 2013</a:t>
+              <a:t>Systems</a:t>
             </a:r>
             <a:r>
               <a:rPr lang="fr-FR" sz="2260" dirty="0">
@@ -5152,376 +4940,187 @@
                   </a:schemeClr>
                 </a:solidFill>
               </a:rPr>
-              <a:t>.</a:t>
-            </a:r>
-          </a:p>
-          <a:p>
-            <a:r>
-              <a:rPr lang="fr-FR" sz="2260" dirty="0">
-                <a:solidFill>
-                  <a:schemeClr val="bg2">
-                    <a:lumMod val="50000"/>
-                  </a:schemeClr>
-                </a:solidFill>
-              </a:rPr>
-              <a:t>[2] M. Shapiro, N. M. </a:t>
-            </a:r>
-            <a:r>
-              <a:rPr lang="fr-FR" sz="2260" dirty="0" err="1">
-                <a:solidFill>
-                  <a:schemeClr val="bg2">
-                    <a:lumMod val="50000"/>
-                  </a:schemeClr>
-                </a:solidFill>
-              </a:rPr>
-              <a:t>Preguiça</a:t>
-            </a:r>
-            <a:r>
-              <a:rPr lang="fr-FR" sz="2260" dirty="0">
-                <a:solidFill>
-                  <a:schemeClr val="bg2">
-                    <a:lumMod val="50000"/>
-                  </a:schemeClr>
-                </a:solidFill>
-              </a:rPr>
-              <a:t>, C. </a:t>
-            </a:r>
-            <a:r>
-              <a:rPr lang="fr-FR" sz="2260" dirty="0" err="1">
-                <a:solidFill>
-                  <a:schemeClr val="bg2">
-                    <a:lumMod val="50000"/>
-                  </a:schemeClr>
-                </a:solidFill>
-              </a:rPr>
-              <a:t>Baquero</a:t>
-            </a:r>
-            <a:r>
-              <a:rPr lang="fr-FR" sz="2260" dirty="0">
-                <a:solidFill>
-                  <a:schemeClr val="bg2">
-                    <a:lumMod val="50000"/>
-                  </a:schemeClr>
-                </a:solidFill>
-              </a:rPr>
-              <a:t>, and M. </a:t>
-            </a:r>
-            <a:r>
-              <a:rPr lang="fr-FR" sz="2260" dirty="0" err="1">
-                <a:solidFill>
-                  <a:schemeClr val="bg2">
-                    <a:lumMod val="50000"/>
-                  </a:schemeClr>
-                </a:solidFill>
-              </a:rPr>
-              <a:t>Zawirski</a:t>
-            </a:r>
-            <a:r>
-              <a:rPr lang="fr-FR" sz="2260" dirty="0">
-                <a:solidFill>
-                  <a:schemeClr val="bg2">
-                    <a:lumMod val="50000"/>
-                  </a:schemeClr>
-                </a:solidFill>
-              </a:rPr>
-              <a:t>. </a:t>
-            </a:r>
-          </a:p>
-          <a:p>
-            <a:r>
-              <a:rPr lang="fr-FR" sz="2260" i="1" dirty="0" err="1">
-                <a:solidFill>
-                  <a:schemeClr val="bg2">
-                    <a:lumMod val="50000"/>
-                  </a:schemeClr>
-                </a:solidFill>
-              </a:rPr>
-              <a:t>Conflict</a:t>
-            </a:r>
-            <a:r>
-              <a:rPr lang="fr-FR" sz="2260" i="1" dirty="0">
-                <a:solidFill>
-                  <a:schemeClr val="bg2">
-                    <a:lumMod val="50000"/>
-                  </a:schemeClr>
-                </a:solidFill>
-              </a:rPr>
-              <a:t>-free </a:t>
-            </a:r>
-            <a:r>
-              <a:rPr lang="fr-FR" sz="2260" i="1" dirty="0" err="1">
-                <a:solidFill>
-                  <a:schemeClr val="bg2">
-                    <a:lumMod val="50000"/>
-                  </a:schemeClr>
-                </a:solidFill>
-              </a:rPr>
-              <a:t>replicated</a:t>
-            </a:r>
-            <a:r>
-              <a:rPr lang="fr-FR" sz="2260" i="1" dirty="0">
-                <a:solidFill>
-                  <a:schemeClr val="bg2">
-                    <a:lumMod val="50000"/>
-                  </a:schemeClr>
-                </a:solidFill>
-              </a:rPr>
-              <a:t> data types.</a:t>
-            </a:r>
-          </a:p>
-          <a:p>
-            <a:r>
-              <a:rPr lang="fr-FR" sz="2260" dirty="0">
-                <a:solidFill>
-                  <a:schemeClr val="bg2">
-                    <a:lumMod val="50000"/>
-                  </a:schemeClr>
-                </a:solidFill>
-              </a:rPr>
-              <a:t>In </a:t>
-            </a:r>
-            <a:r>
-              <a:rPr lang="fr-FR" sz="2260" i="1" dirty="0" err="1">
-                <a:solidFill>
-                  <a:schemeClr val="bg2">
-                    <a:lumMod val="50000"/>
-                  </a:schemeClr>
-                </a:solidFill>
-              </a:rPr>
-              <a:t>Proceedings</a:t>
-            </a:r>
-            <a:r>
-              <a:rPr lang="fr-FR" sz="2260" i="1" dirty="0">
-                <a:solidFill>
-                  <a:schemeClr val="bg2">
-                    <a:lumMod val="50000"/>
-                  </a:schemeClr>
-                </a:solidFill>
-              </a:rPr>
-              <a:t> of the 13th International Symposium on </a:t>
-            </a:r>
-            <a:r>
-              <a:rPr lang="fr-FR" sz="2260" i="1" dirty="0" err="1">
-                <a:solidFill>
-                  <a:schemeClr val="bg2">
-                    <a:lumMod val="50000"/>
-                  </a:schemeClr>
-                </a:solidFill>
-              </a:rPr>
-              <a:t>Stabilization</a:t>
-            </a:r>
-            <a:r>
-              <a:rPr lang="fr-FR" sz="2260" i="1" dirty="0">
-                <a:solidFill>
-                  <a:schemeClr val="bg2">
-                    <a:lumMod val="50000"/>
-                  </a:schemeClr>
-                </a:solidFill>
-              </a:rPr>
-              <a:t>, </a:t>
-            </a:r>
-            <a:r>
-              <a:rPr lang="fr-FR" sz="2260" i="1" dirty="0" err="1">
-                <a:solidFill>
-                  <a:schemeClr val="bg2">
-                    <a:lumMod val="50000"/>
-                  </a:schemeClr>
-                </a:solidFill>
-              </a:rPr>
-              <a:t>Safety</a:t>
-            </a:r>
-            <a:r>
-              <a:rPr lang="fr-FR" sz="2260" i="1" dirty="0">
-                <a:solidFill>
-                  <a:schemeClr val="bg2">
-                    <a:lumMod val="50000"/>
-                  </a:schemeClr>
-                </a:solidFill>
-              </a:rPr>
-              <a:t>, and Security of </a:t>
-            </a:r>
-            <a:r>
-              <a:rPr lang="fr-FR" sz="2260" i="1" dirty="0" err="1">
-                <a:solidFill>
-                  <a:schemeClr val="bg2">
-                    <a:lumMod val="50000"/>
-                  </a:schemeClr>
-                </a:solidFill>
-              </a:rPr>
-              <a:t>Distributed</a:t>
-            </a:r>
-            <a:r>
-              <a:rPr lang="fr-FR" sz="2260" i="1" dirty="0">
-                <a:solidFill>
-                  <a:schemeClr val="bg2">
-                    <a:lumMod val="50000"/>
-                  </a:schemeClr>
-                </a:solidFill>
-              </a:rPr>
-              <a:t> </a:t>
-            </a:r>
-            <a:r>
-              <a:rPr lang="fr-FR" sz="2260" i="1" dirty="0" err="1">
-                <a:solidFill>
-                  <a:schemeClr val="bg2">
-                    <a:lumMod val="50000"/>
-                  </a:schemeClr>
-                </a:solidFill>
-              </a:rPr>
-              <a:t>Systems</a:t>
-            </a:r>
-            <a:r>
-              <a:rPr lang="fr-FR" sz="2260" dirty="0">
-                <a:solidFill>
-                  <a:schemeClr val="bg2">
-                    <a:lumMod val="50000"/>
-                  </a:schemeClr>
-                </a:solidFill>
-              </a:rPr>
               <a:t>, SSS 2011.</a:t>
             </a:r>
           </a:p>
-          <a:p>
-            <a:endParaRPr lang="fr-FR" sz="2260" dirty="0">
-              <a:solidFill>
-                <a:schemeClr val="bg2">
-                  <a:lumMod val="50000"/>
-                </a:schemeClr>
-              </a:solidFill>
-            </a:endParaRPr>
-          </a:p>
-        </p:txBody>
-      </p:sp>
-      <p:sp>
-        <p:nvSpPr>
-          <p:cNvPr id="37" name="ZoneTexte 30">
+        </p:txBody>
+      </p:sp>
+      <p:grpSp>
+        <p:nvGrpSpPr>
+          <p:cNvPr id="24" name="Group 23">
             <a:extLst>
               <a:ext uri="{FF2B5EF4-FFF2-40B4-BE49-F238E27FC236}">
-                <a16:creationId xmlns:a16="http://schemas.microsoft.com/office/drawing/2014/main" id="{E39D2270-2150-6841-AA50-305F32CC7205}"/>
+                <a16:creationId xmlns:a16="http://schemas.microsoft.com/office/drawing/2014/main" id="{F2AA2832-158A-6D4D-B492-EB6F18C34887}"/>
               </a:ext>
             </a:extLst>
           </p:cNvPr>
-          <p:cNvSpPr txBox="1"/>
+          <p:cNvGrpSpPr/>
           <p:nvPr/>
-        </p:nvSpPr>
-        <p:spPr>
+        </p:nvGrpSpPr>
+        <p:grpSpPr>
           <a:xfrm>
-            <a:off x="10810907" y="19532143"/>
-            <a:ext cx="20705454" cy="1135952"/>
+            <a:off x="10114076" y="17854588"/>
+            <a:ext cx="10377688" cy="2962509"/>
+            <a:chOff x="11077808" y="17617309"/>
+            <a:chExt cx="9407129" cy="2962509"/>
           </a:xfrm>
-          <a:prstGeom prst="rect">
-            <a:avLst/>
-          </a:prstGeom>
-          <a:noFill/>
-        </p:spPr>
-        <p:txBody>
-          <a:bodyPr wrap="square" numCol="1" rtlCol="0">
-            <a:spAutoFit/>
-          </a:bodyPr>
-          <a:lstStyle/>
-          <a:p>
-            <a:pPr marL="403765" indent="-403765" algn="just">
-              <a:buFont typeface="Arial" panose="020B0604020202020204" pitchFamily="34" charset="0"/>
-              <a:buChar char="•"/>
-            </a:pPr>
-            <a:r>
-              <a:rPr lang="en-GB" sz="3391" dirty="0"/>
-              <a:t>Pick a “winner” operation between concurrent </a:t>
-            </a:r>
-            <a:r>
-              <a:rPr lang="en-GB" sz="3391" i="1" dirty="0"/>
-              <a:t>renames</a:t>
-            </a:r>
-          </a:p>
-          <a:p>
-            <a:pPr marL="403765" indent="-403765" algn="just">
-              <a:buFont typeface="Arial" panose="020B0604020202020204" pitchFamily="34" charset="0"/>
-              <a:buChar char="•"/>
-            </a:pPr>
-            <a:r>
-              <a:rPr lang="en-GB" sz="3391" dirty="0"/>
-              <a:t>Add rewriting rules to </a:t>
-            </a:r>
-            <a:r>
-              <a:rPr lang="en-GB" sz="3391" i="1" dirty="0"/>
-              <a:t>undo </a:t>
-            </a:r>
-            <a:r>
-              <a:rPr lang="en-GB" sz="3391" dirty="0"/>
-              <a:t>effects of “losing” ones</a:t>
-            </a:r>
-          </a:p>
-        </p:txBody>
-      </p:sp>
-      <p:sp>
-        <p:nvSpPr>
-          <p:cNvPr id="38" name="ZoneTexte 30">
+        </p:grpSpPr>
+        <p:sp>
+          <p:nvSpPr>
+            <p:cNvPr id="65" name="ZoneTexte 23">
+              <a:extLst>
+                <a:ext uri="{FF2B5EF4-FFF2-40B4-BE49-F238E27FC236}">
+                  <a16:creationId xmlns:a16="http://schemas.microsoft.com/office/drawing/2014/main" id="{A46BA2E5-D5CD-D64B-BCA6-E17723A2A604}"/>
+                </a:ext>
+              </a:extLst>
+            </p:cNvPr>
+            <p:cNvSpPr txBox="1"/>
+            <p:nvPr/>
+          </p:nvSpPr>
+          <p:spPr>
+            <a:xfrm>
+              <a:off x="11077808" y="17617309"/>
+              <a:ext cx="9407128" cy="744691"/>
+            </a:xfrm>
+            <a:prstGeom prst="rect">
+              <a:avLst/>
+            </a:prstGeom>
+            <a:noFill/>
+          </p:spPr>
+          <p:txBody>
+            <a:bodyPr wrap="square" rtlCol="0">
+              <a:spAutoFit/>
+            </a:bodyPr>
+            <a:lstStyle/>
+            <a:p>
+              <a:r>
+                <a:rPr lang="en-GB" sz="4239" dirty="0">
+                  <a:latin typeface="Calibri Light" panose="020F0302020204030204" pitchFamily="34" charset="0"/>
+                  <a:cs typeface="Calibri Light" panose="020F0302020204030204" pitchFamily="34" charset="0"/>
+                </a:rPr>
+                <a:t>Concurrent </a:t>
+              </a:r>
+              <a:r>
+                <a:rPr lang="en-GB" sz="4239" i="1" dirty="0">
+                  <a:latin typeface="Calibri Light" panose="020F0302020204030204" pitchFamily="34" charset="0"/>
+                  <a:cs typeface="Calibri Light" panose="020F0302020204030204" pitchFamily="34" charset="0"/>
+                </a:rPr>
+                <a:t>rename</a:t>
+              </a:r>
+              <a:r>
+                <a:rPr lang="en-GB" sz="4239" dirty="0">
+                  <a:latin typeface="Calibri Light" panose="020F0302020204030204" pitchFamily="34" charset="0"/>
+                  <a:cs typeface="Calibri Light" panose="020F0302020204030204" pitchFamily="34" charset="0"/>
+                </a:rPr>
+                <a:t> operations</a:t>
+              </a:r>
+            </a:p>
+          </p:txBody>
+        </p:sp>
+        <p:sp>
+          <p:nvSpPr>
+            <p:cNvPr id="37" name="ZoneTexte 30">
+              <a:extLst>
+                <a:ext uri="{FF2B5EF4-FFF2-40B4-BE49-F238E27FC236}">
+                  <a16:creationId xmlns:a16="http://schemas.microsoft.com/office/drawing/2014/main" id="{E39D2270-2150-6841-AA50-305F32CC7205}"/>
+                </a:ext>
+              </a:extLst>
+            </p:cNvPr>
+            <p:cNvSpPr txBox="1"/>
+            <p:nvPr/>
+          </p:nvSpPr>
+          <p:spPr>
+            <a:xfrm>
+              <a:off x="11077809" y="18400247"/>
+              <a:ext cx="9407128" cy="2179571"/>
+            </a:xfrm>
+            <a:prstGeom prst="rect">
+              <a:avLst/>
+            </a:prstGeom>
+            <a:noFill/>
+          </p:spPr>
+          <p:txBody>
+            <a:bodyPr wrap="square" numCol="1" rtlCol="0">
+              <a:spAutoFit/>
+            </a:bodyPr>
+            <a:lstStyle/>
+            <a:p>
+              <a:pPr marL="403765" indent="-403765" algn="just">
+                <a:buFont typeface="Arial" panose="020B0604020202020204" pitchFamily="34" charset="0"/>
+                <a:buChar char="•"/>
+              </a:pPr>
+              <a:r>
+                <a:rPr lang="en-GB" sz="3391" dirty="0"/>
+                <a:t>Proposed </a:t>
+              </a:r>
+              <a:r>
+                <a:rPr lang="en-GB" sz="3391" i="1" dirty="0"/>
+                <a:t>rename</a:t>
+              </a:r>
+              <a:r>
+                <a:rPr lang="en-GB" sz="3391" dirty="0"/>
+                <a:t> operation not commutative</a:t>
+              </a:r>
+            </a:p>
+            <a:p>
+              <a:pPr marL="403765" indent="-403765" algn="just">
+                <a:buFont typeface="Arial" panose="020B0604020202020204" pitchFamily="34" charset="0"/>
+                <a:buChar char="•"/>
+              </a:pPr>
+              <a:r>
+                <a:rPr lang="en-GB" sz="3391" dirty="0"/>
+                <a:t>Define a total order on</a:t>
+              </a:r>
+              <a:r>
+                <a:rPr lang="en-GB" sz="3391" i="1" dirty="0"/>
+                <a:t> rename</a:t>
+              </a:r>
+              <a:r>
+                <a:rPr lang="en-GB" sz="3391" dirty="0"/>
+                <a:t> operations</a:t>
+              </a:r>
+            </a:p>
+            <a:p>
+              <a:pPr marL="403765" indent="-403765" algn="just">
+                <a:buFont typeface="Arial" panose="020B0604020202020204" pitchFamily="34" charset="0"/>
+                <a:buChar char="•"/>
+              </a:pPr>
+              <a:r>
+                <a:rPr lang="en-GB" sz="3391" dirty="0"/>
+                <a:t>Pick a “winner” operation between concurrent </a:t>
+              </a:r>
+              <a:r>
+                <a:rPr lang="en-GB" sz="3391" i="1" dirty="0"/>
+                <a:t>renames</a:t>
+              </a:r>
+            </a:p>
+            <a:p>
+              <a:pPr marL="403765" indent="-403765" algn="just">
+                <a:buFont typeface="Arial" panose="020B0604020202020204" pitchFamily="34" charset="0"/>
+                <a:buChar char="•"/>
+              </a:pPr>
+              <a:r>
+                <a:rPr lang="en-GB" sz="3391" dirty="0"/>
+                <a:t>Add rewriting rules to </a:t>
+              </a:r>
+              <a:r>
+                <a:rPr lang="en-GB" sz="3391" i="1" dirty="0"/>
+                <a:t>undo </a:t>
+              </a:r>
+              <a:r>
+                <a:rPr lang="en-GB" sz="3391" dirty="0"/>
+                <a:t>effects of “losing” ones</a:t>
+              </a:r>
+            </a:p>
+          </p:txBody>
+        </p:sp>
+      </p:grpSp>
+      <p:pic>
+        <p:nvPicPr>
+          <p:cNvPr id="8" name="Graphic 7">
             <a:extLst>
               <a:ext uri="{FF2B5EF4-FFF2-40B4-BE49-F238E27FC236}">
-                <a16:creationId xmlns:a16="http://schemas.microsoft.com/office/drawing/2014/main" id="{EA2980D9-EAF7-664E-9796-DDCF33DC8C0B}"/>
-              </a:ext>
-            </a:extLst>
-          </p:cNvPr>
-          <p:cNvSpPr txBox="1"/>
-          <p:nvPr/>
-        </p:nvSpPr>
-        <p:spPr>
-          <a:xfrm>
-            <a:off x="10810907" y="22402254"/>
-            <a:ext cx="10427567" cy="1657762"/>
-          </a:xfrm>
-          <a:prstGeom prst="rect">
-            <a:avLst/>
-          </a:prstGeom>
-          <a:noFill/>
-        </p:spPr>
-        <p:txBody>
-          <a:bodyPr wrap="square" numCol="1" rtlCol="0">
-            <a:spAutoFit/>
-          </a:bodyPr>
-          <a:lstStyle/>
-          <a:p>
-            <a:pPr marL="403765" indent="-403765">
-              <a:buFont typeface="Arial" panose="020B0604020202020204" pitchFamily="34" charset="0"/>
-              <a:buChar char="•"/>
-            </a:pPr>
-            <a:r>
-              <a:rPr lang="en-GB" sz="3391" b="1" dirty="0"/>
-              <a:t>WIP: </a:t>
-            </a:r>
-            <a:r>
-              <a:rPr lang="en-GB" sz="3391" dirty="0"/>
-              <a:t>Design the strategy to trigger the renaming</a:t>
-            </a:r>
-          </a:p>
-          <a:p>
-            <a:pPr marL="403765" indent="-403765">
-              <a:buFont typeface="Arial" panose="020B0604020202020204" pitchFamily="34" charset="0"/>
-              <a:buChar char="•"/>
-            </a:pPr>
-            <a:r>
-              <a:rPr lang="en-GB" sz="3391" dirty="0"/>
-              <a:t>Prove formally its correctness</a:t>
-            </a:r>
-          </a:p>
-          <a:p>
-            <a:pPr marL="403765" indent="-403765">
-              <a:buFont typeface="Arial" panose="020B0604020202020204" pitchFamily="34" charset="0"/>
-              <a:buChar char="•"/>
-            </a:pPr>
-            <a:r>
-              <a:rPr lang="en-GB" sz="3391" dirty="0"/>
-              <a:t>Benchmark its performances</a:t>
-            </a:r>
-          </a:p>
-        </p:txBody>
-      </p:sp>
-      <p:pic>
-        <p:nvPicPr>
-          <p:cNvPr id="3" name="Picture 2">
-            <a:extLst>
-              <a:ext uri="{FF2B5EF4-FFF2-40B4-BE49-F238E27FC236}">
-                <a16:creationId xmlns:a16="http://schemas.microsoft.com/office/drawing/2014/main" id="{B1D9D5DE-748D-9F43-8B56-710D9E023D78}"/>
+                <a16:creationId xmlns:a16="http://schemas.microsoft.com/office/drawing/2014/main" id="{C1641D92-D1A4-B74E-96C5-B6FE24439E52}"/>
               </a:ext>
             </a:extLst>
           </p:cNvPr>
@@ -5531,21 +5130,535 @@
           <p:nvPr/>
         </p:nvPicPr>
         <p:blipFill>
-          <a:blip r:embed="rId12"/>
+          <a:blip r:embed="rId11">
+            <a:extLst>
+              <a:ext uri="{96DAC541-7B7A-43D3-8B79-37D633B846F1}">
+                <asvg:svgBlip xmlns:asvg="http://schemas.microsoft.com/office/drawing/2016/SVG/main" r:embed="rId12"/>
+              </a:ext>
+            </a:extLst>
+          </a:blip>
           <a:stretch>
             <a:fillRect/>
           </a:stretch>
         </p:blipFill>
         <p:spPr>
           <a:xfrm>
-            <a:off x="14788653" y="5703547"/>
-            <a:ext cx="5648205" cy="4219342"/>
+            <a:off x="3263932" y="22819980"/>
+            <a:ext cx="923268" cy="923268"/>
           </a:xfrm>
           <a:prstGeom prst="rect">
             <a:avLst/>
           </a:prstGeom>
         </p:spPr>
       </p:pic>
+      <p:pic>
+        <p:nvPicPr>
+          <p:cNvPr id="42" name="Graphic 41">
+            <a:extLst>
+              <a:ext uri="{FF2B5EF4-FFF2-40B4-BE49-F238E27FC236}">
+                <a16:creationId xmlns:a16="http://schemas.microsoft.com/office/drawing/2014/main" id="{A8BD7C2A-75D3-F245-A5C5-36697F8DE8C7}"/>
+              </a:ext>
+            </a:extLst>
+          </p:cNvPr>
+          <p:cNvPicPr>
+            <a:picLocks noChangeAspect="1"/>
+          </p:cNvPicPr>
+          <p:nvPr/>
+        </p:nvPicPr>
+        <p:blipFill>
+          <a:blip r:embed="rId13">
+            <a:extLst>
+              <a:ext uri="{96DAC541-7B7A-43D3-8B79-37D633B846F1}">
+                <asvg:svgBlip xmlns:asvg="http://schemas.microsoft.com/office/drawing/2016/SVG/main" r:embed="rId14"/>
+              </a:ext>
+            </a:extLst>
+          </a:blip>
+          <a:stretch>
+            <a:fillRect/>
+          </a:stretch>
+        </p:blipFill>
+        <p:spPr>
+          <a:xfrm>
+            <a:off x="10176032" y="22823708"/>
+            <a:ext cx="923268" cy="923268"/>
+          </a:xfrm>
+          <a:prstGeom prst="rect">
+            <a:avLst/>
+          </a:prstGeom>
+        </p:spPr>
+      </p:pic>
+      <p:pic>
+        <p:nvPicPr>
+          <p:cNvPr id="43" name="Graphic 42">
+            <a:extLst>
+              <a:ext uri="{FF2B5EF4-FFF2-40B4-BE49-F238E27FC236}">
+                <a16:creationId xmlns:a16="http://schemas.microsoft.com/office/drawing/2014/main" id="{FDC19F91-3F4C-7342-B953-EECA1B519DEC}"/>
+              </a:ext>
+            </a:extLst>
+          </p:cNvPr>
+          <p:cNvPicPr>
+            <a:picLocks noChangeAspect="1"/>
+          </p:cNvPicPr>
+          <p:nvPr/>
+        </p:nvPicPr>
+        <p:blipFill>
+          <a:blip r:embed="rId15">
+            <a:extLst>
+              <a:ext uri="{96DAC541-7B7A-43D3-8B79-37D633B846F1}">
+                <asvg:svgBlip xmlns:asvg="http://schemas.microsoft.com/office/drawing/2016/SVG/main" r:embed="rId16"/>
+              </a:ext>
+            </a:extLst>
+          </a:blip>
+          <a:stretch>
+            <a:fillRect/>
+          </a:stretch>
+        </p:blipFill>
+        <p:spPr>
+          <a:xfrm>
+            <a:off x="17088132" y="22819980"/>
+            <a:ext cx="923268" cy="923268"/>
+          </a:xfrm>
+          <a:prstGeom prst="rect">
+            <a:avLst/>
+          </a:prstGeom>
+        </p:spPr>
+      </p:pic>
+      <p:sp>
+        <p:nvSpPr>
+          <p:cNvPr id="11" name="Right Brace 10">
+            <a:extLst>
+              <a:ext uri="{FF2B5EF4-FFF2-40B4-BE49-F238E27FC236}">
+                <a16:creationId xmlns:a16="http://schemas.microsoft.com/office/drawing/2014/main" id="{3D6F9E00-D35F-6C49-BB66-DD72DAC6809C}"/>
+              </a:ext>
+            </a:extLst>
+          </p:cNvPr>
+          <p:cNvSpPr/>
+          <p:nvPr/>
+        </p:nvSpPr>
+        <p:spPr>
+          <a:xfrm>
+            <a:off x="13348494" y="7062851"/>
+            <a:ext cx="746284" cy="2562667"/>
+          </a:xfrm>
+          <a:prstGeom prst="rightBrace">
+            <a:avLst/>
+          </a:prstGeom>
+        </p:spPr>
+        <p:style>
+          <a:lnRef idx="1">
+            <a:schemeClr val="accent2"/>
+          </a:lnRef>
+          <a:fillRef idx="0">
+            <a:schemeClr val="accent2"/>
+          </a:fillRef>
+          <a:effectRef idx="0">
+            <a:schemeClr val="accent2"/>
+          </a:effectRef>
+          <a:fontRef idx="minor">
+            <a:schemeClr val="tx1"/>
+          </a:fontRef>
+        </p:style>
+        <p:txBody>
+          <a:bodyPr rtlCol="0" anchor="ctr"/>
+          <a:lstStyle/>
+          <a:p>
+            <a:pPr algn="ctr"/>
+            <a:endParaRPr lang="fr-FR"/>
+          </a:p>
+        </p:txBody>
+      </p:sp>
+      <p:pic>
+        <p:nvPicPr>
+          <p:cNvPr id="17" name="Picture 16">
+            <a:extLst>
+              <a:ext uri="{FF2B5EF4-FFF2-40B4-BE49-F238E27FC236}">
+                <a16:creationId xmlns:a16="http://schemas.microsoft.com/office/drawing/2014/main" id="{2EC7EF74-5F2B-254E-8A8E-8996CC6C592C}"/>
+              </a:ext>
+            </a:extLst>
+          </p:cNvPr>
+          <p:cNvPicPr>
+            <a:picLocks noChangeAspect="1"/>
+          </p:cNvPicPr>
+          <p:nvPr/>
+        </p:nvPicPr>
+        <p:blipFill>
+          <a:blip r:embed="rId17"/>
+          <a:stretch>
+            <a:fillRect/>
+          </a:stretch>
+        </p:blipFill>
+        <p:spPr>
+          <a:xfrm>
+            <a:off x="1557122" y="12549038"/>
+            <a:ext cx="7480229" cy="8197984"/>
+          </a:xfrm>
+          <a:prstGeom prst="rect">
+            <a:avLst/>
+          </a:prstGeom>
+        </p:spPr>
+      </p:pic>
+      <p:sp>
+        <p:nvSpPr>
+          <p:cNvPr id="51" name="Rectangle 50">
+            <a:extLst>
+              <a:ext uri="{FF2B5EF4-FFF2-40B4-BE49-F238E27FC236}">
+                <a16:creationId xmlns:a16="http://schemas.microsoft.com/office/drawing/2014/main" id="{699F117E-FC24-1F45-8F14-4981B19F34CC}"/>
+              </a:ext>
+            </a:extLst>
+          </p:cNvPr>
+          <p:cNvSpPr/>
+          <p:nvPr/>
+        </p:nvSpPr>
+        <p:spPr>
+          <a:xfrm>
+            <a:off x="10862914" y="26901884"/>
+            <a:ext cx="10189500" cy="1483483"/>
+          </a:xfrm>
+          <a:prstGeom prst="rect">
+            <a:avLst/>
+          </a:prstGeom>
+        </p:spPr>
+        <p:txBody>
+          <a:bodyPr wrap="square" numCol="1">
+            <a:spAutoFit/>
+          </a:bodyPr>
+          <a:lstStyle/>
+          <a:p>
+            <a:r>
+              <a:rPr lang="fr-FR" sz="2260" dirty="0">
+                <a:solidFill>
+                  <a:schemeClr val="bg2">
+                    <a:lumMod val="50000"/>
+                  </a:schemeClr>
+                </a:solidFill>
+              </a:rPr>
+              <a:t>[2] L. André, S. Martin, G. </a:t>
+            </a:r>
+            <a:r>
+              <a:rPr lang="fr-FR" sz="2260" dirty="0" err="1">
+                <a:solidFill>
+                  <a:schemeClr val="bg2">
+                    <a:lumMod val="50000"/>
+                  </a:schemeClr>
+                </a:solidFill>
+              </a:rPr>
+              <a:t>Oster</a:t>
+            </a:r>
+            <a:r>
+              <a:rPr lang="fr-FR" sz="2260" dirty="0">
+                <a:solidFill>
+                  <a:schemeClr val="bg2">
+                    <a:lumMod val="50000"/>
+                  </a:schemeClr>
+                </a:solidFill>
+              </a:rPr>
+              <a:t>, and C.-L. Ignat.</a:t>
+            </a:r>
+          </a:p>
+          <a:p>
+            <a:r>
+              <a:rPr lang="fr-FR" sz="2260" i="1" dirty="0" err="1">
+                <a:solidFill>
+                  <a:schemeClr val="bg2">
+                    <a:lumMod val="50000"/>
+                  </a:schemeClr>
+                </a:solidFill>
+              </a:rPr>
+              <a:t>Supporting</a:t>
+            </a:r>
+            <a:r>
+              <a:rPr lang="fr-FR" sz="2260" i="1" dirty="0">
+                <a:solidFill>
+                  <a:schemeClr val="bg2">
+                    <a:lumMod val="50000"/>
+                  </a:schemeClr>
+                </a:solidFill>
+              </a:rPr>
+              <a:t> adaptable </a:t>
+            </a:r>
+            <a:r>
+              <a:rPr lang="fr-FR" sz="2260" i="1" dirty="0" err="1">
+                <a:solidFill>
+                  <a:schemeClr val="bg2">
+                    <a:lumMod val="50000"/>
+                  </a:schemeClr>
+                </a:solidFill>
+              </a:rPr>
+              <a:t>granularity</a:t>
+            </a:r>
+            <a:r>
+              <a:rPr lang="fr-FR" sz="2260" i="1" dirty="0">
+                <a:solidFill>
+                  <a:schemeClr val="bg2">
+                    <a:lumMod val="50000"/>
+                  </a:schemeClr>
+                </a:solidFill>
+              </a:rPr>
+              <a:t> of changes for massive-</a:t>
+            </a:r>
+            <a:r>
+              <a:rPr lang="fr-FR" sz="2260" i="1" dirty="0" err="1">
+                <a:solidFill>
+                  <a:schemeClr val="bg2">
+                    <a:lumMod val="50000"/>
+                  </a:schemeClr>
+                </a:solidFill>
+              </a:rPr>
+              <a:t>scale</a:t>
+            </a:r>
+            <a:r>
+              <a:rPr lang="fr-FR" sz="2260" i="1" dirty="0">
+                <a:solidFill>
+                  <a:schemeClr val="bg2">
+                    <a:lumMod val="50000"/>
+                  </a:schemeClr>
+                </a:solidFill>
+              </a:rPr>
+              <a:t> collaborative </a:t>
+            </a:r>
+            <a:r>
+              <a:rPr lang="fr-FR" sz="2260" i="1" dirty="0" err="1">
+                <a:solidFill>
+                  <a:schemeClr val="bg2">
+                    <a:lumMod val="50000"/>
+                  </a:schemeClr>
+                </a:solidFill>
+              </a:rPr>
+              <a:t>editing</a:t>
+            </a:r>
+            <a:r>
+              <a:rPr lang="fr-FR" sz="2260" dirty="0">
+                <a:solidFill>
+                  <a:schemeClr val="bg2">
+                    <a:lumMod val="50000"/>
+                  </a:schemeClr>
+                </a:solidFill>
+              </a:rPr>
+              <a:t>.</a:t>
+            </a:r>
+          </a:p>
+          <a:p>
+            <a:r>
+              <a:rPr lang="fr-FR" sz="2260" dirty="0">
+                <a:solidFill>
+                  <a:schemeClr val="bg2">
+                    <a:lumMod val="50000"/>
+                  </a:schemeClr>
+                </a:solidFill>
+              </a:rPr>
+              <a:t>In </a:t>
+            </a:r>
+            <a:r>
+              <a:rPr lang="fr-FR" sz="2260" i="1" dirty="0">
+                <a:solidFill>
+                  <a:schemeClr val="bg2">
+                    <a:lumMod val="50000"/>
+                  </a:schemeClr>
+                </a:solidFill>
+              </a:rPr>
+              <a:t>International </a:t>
+            </a:r>
+            <a:r>
+              <a:rPr lang="fr-FR" sz="2260" i="1" dirty="0" err="1">
+                <a:solidFill>
+                  <a:schemeClr val="bg2">
+                    <a:lumMod val="50000"/>
+                  </a:schemeClr>
+                </a:solidFill>
+              </a:rPr>
+              <a:t>Conference</a:t>
+            </a:r>
+            <a:r>
+              <a:rPr lang="fr-FR" sz="2260" i="1" dirty="0">
+                <a:solidFill>
+                  <a:schemeClr val="bg2">
+                    <a:lumMod val="50000"/>
+                  </a:schemeClr>
+                </a:solidFill>
+              </a:rPr>
+              <a:t> on Collaborative </a:t>
+            </a:r>
+            <a:r>
+              <a:rPr lang="fr-FR" sz="2260" i="1" dirty="0" err="1">
+                <a:solidFill>
+                  <a:schemeClr val="bg2">
+                    <a:lumMod val="50000"/>
+                  </a:schemeClr>
+                </a:solidFill>
+              </a:rPr>
+              <a:t>Computing</a:t>
+            </a:r>
+            <a:r>
+              <a:rPr lang="fr-FR" sz="2260" i="1" dirty="0">
+                <a:solidFill>
+                  <a:schemeClr val="bg2">
+                    <a:lumMod val="50000"/>
+                  </a:schemeClr>
+                </a:solidFill>
+              </a:rPr>
+              <a:t>: Networking, Applications and </a:t>
+            </a:r>
+            <a:r>
+              <a:rPr lang="fr-FR" sz="2260" i="1" dirty="0" err="1">
+                <a:solidFill>
+                  <a:schemeClr val="bg2">
+                    <a:lumMod val="50000"/>
+                  </a:schemeClr>
+                </a:solidFill>
+              </a:rPr>
+              <a:t>Worksharing</a:t>
+            </a:r>
+            <a:r>
+              <a:rPr lang="fr-FR" sz="2260" i="1" dirty="0">
+                <a:solidFill>
+                  <a:schemeClr val="bg2">
+                    <a:lumMod val="50000"/>
+                  </a:schemeClr>
+                </a:solidFill>
+              </a:rPr>
+              <a:t> - </a:t>
+            </a:r>
+            <a:r>
+              <a:rPr lang="fr-FR" sz="2260" i="1" dirty="0" err="1">
+                <a:solidFill>
+                  <a:schemeClr val="bg2">
+                    <a:lumMod val="50000"/>
+                  </a:schemeClr>
+                </a:solidFill>
+              </a:rPr>
+              <a:t>CollaborateCom</a:t>
+            </a:r>
+            <a:r>
+              <a:rPr lang="fr-FR" sz="2260" i="1" dirty="0">
+                <a:solidFill>
+                  <a:schemeClr val="bg2">
+                    <a:lumMod val="50000"/>
+                  </a:schemeClr>
+                </a:solidFill>
+              </a:rPr>
+              <a:t> 2013</a:t>
+            </a:r>
+            <a:r>
+              <a:rPr lang="fr-FR" sz="2260" dirty="0">
+                <a:solidFill>
+                  <a:schemeClr val="bg2">
+                    <a:lumMod val="50000"/>
+                  </a:schemeClr>
+                </a:solidFill>
+              </a:rPr>
+              <a:t>.</a:t>
+            </a:r>
+          </a:p>
+        </p:txBody>
+      </p:sp>
+      <p:sp>
+        <p:nvSpPr>
+          <p:cNvPr id="53" name="ZoneTexte 30">
+            <a:extLst>
+              <a:ext uri="{FF2B5EF4-FFF2-40B4-BE49-F238E27FC236}">
+                <a16:creationId xmlns:a16="http://schemas.microsoft.com/office/drawing/2014/main" id="{C3DE600D-CCA7-A84F-B530-4BD372C4CA73}"/>
+              </a:ext>
+            </a:extLst>
+          </p:cNvPr>
+          <p:cNvSpPr txBox="1"/>
+          <p:nvPr/>
+        </p:nvSpPr>
+        <p:spPr>
+          <a:xfrm>
+            <a:off x="8083498" y="23959480"/>
+            <a:ext cx="5086098" cy="2179571"/>
+          </a:xfrm>
+          <a:prstGeom prst="rect">
+            <a:avLst/>
+          </a:prstGeom>
+          <a:noFill/>
+        </p:spPr>
+        <p:txBody>
+          <a:bodyPr wrap="square" numCol="1" rtlCol="0">
+            <a:spAutoFit/>
+          </a:bodyPr>
+          <a:lstStyle/>
+          <a:p>
+            <a:pPr marL="403765" indent="-403765">
+              <a:buFont typeface="Arial" panose="020B0604020202020204" pitchFamily="34" charset="0"/>
+              <a:buChar char="•"/>
+            </a:pPr>
+            <a:r>
+              <a:rPr lang="en-GB" sz="3391" dirty="0"/>
+              <a:t>Implementing in MUTE (</a:t>
+            </a:r>
+            <a:r>
+              <a:rPr lang="en-GB" sz="3391" dirty="0">
+                <a:hlinkClick r:id="rId18"/>
+              </a:rPr>
+              <a:t>https://coedit.re/</a:t>
+            </a:r>
+            <a:r>
+              <a:rPr lang="en-GB" sz="3391" dirty="0"/>
+              <a:t>)</a:t>
+            </a:r>
+          </a:p>
+          <a:p>
+            <a:pPr marL="403765" indent="-403765">
+              <a:buFont typeface="Arial" panose="020B0604020202020204" pitchFamily="34" charset="0"/>
+              <a:buChar char="•"/>
+            </a:pPr>
+            <a:r>
+              <a:rPr lang="en-GB" sz="3391" dirty="0"/>
+              <a:t>Designing the strategy to trigger the renaming</a:t>
+            </a:r>
+          </a:p>
+        </p:txBody>
+      </p:sp>
+      <p:sp>
+        <p:nvSpPr>
+          <p:cNvPr id="56" name="ZoneTexte 30">
+            <a:extLst>
+              <a:ext uri="{FF2B5EF4-FFF2-40B4-BE49-F238E27FC236}">
+                <a16:creationId xmlns:a16="http://schemas.microsoft.com/office/drawing/2014/main" id="{947963A6-165B-594D-A47C-567E0E19E67C}"/>
+              </a:ext>
+            </a:extLst>
+          </p:cNvPr>
+          <p:cNvSpPr txBox="1"/>
+          <p:nvPr/>
+        </p:nvSpPr>
+        <p:spPr>
+          <a:xfrm>
+            <a:off x="14568505" y="23959480"/>
+            <a:ext cx="5961035" cy="2179571"/>
+          </a:xfrm>
+          <a:prstGeom prst="rect">
+            <a:avLst/>
+          </a:prstGeom>
+          <a:noFill/>
+        </p:spPr>
+        <p:txBody>
+          <a:bodyPr wrap="square" numCol="1" rtlCol="0">
+            <a:spAutoFit/>
+          </a:bodyPr>
+          <a:lstStyle/>
+          <a:p>
+            <a:pPr marL="403765" indent="-403765">
+              <a:buFont typeface="Arial" panose="020B0604020202020204" pitchFamily="34" charset="0"/>
+              <a:buChar char="•"/>
+            </a:pPr>
+            <a:r>
+              <a:rPr lang="en-GB" sz="3391" dirty="0"/>
+              <a:t>Prove formally the correctness of the renaming mechanism</a:t>
+            </a:r>
+          </a:p>
+          <a:p>
+            <a:pPr marL="403765" indent="-403765">
+              <a:buFont typeface="Arial" panose="020B0604020202020204" pitchFamily="34" charset="0"/>
+              <a:buChar char="•"/>
+            </a:pPr>
+            <a:r>
+              <a:rPr lang="en-GB" sz="3391" dirty="0"/>
+              <a:t>Benchmark its performances (Memory, CPU, Bandwidth, …)</a:t>
+            </a:r>
+          </a:p>
+        </p:txBody>
+      </p:sp>
     </p:spTree>
     <p:extLst>
       <p:ext uri="{BB962C8B-B14F-4D97-AF65-F5344CB8AC3E}">

</xml_diff>

<commit_message>
feat(poster): Improve design of subtitles and braces
</commit_message>
<xml_diff>
--- a/poster/poster.pptx
+++ b/poster/poster.pptx
@@ -3483,7 +3483,7 @@
         <p:spPr>
           <a:xfrm>
             <a:off x="-23264" y="11087012"/>
-            <a:ext cx="21388389" cy="777264"/>
+            <a:ext cx="21388389" cy="830997"/>
           </a:xfrm>
           <a:prstGeom prst="rect">
             <a:avLst/>
@@ -3498,8 +3498,12 @@
           <a:p>
             <a:pPr algn="ctr"/>
             <a:r>
-              <a:rPr lang="en-GB" sz="4451" i="1" dirty="0">
-                <a:latin typeface="+mj-lt"/>
+              <a:rPr lang="en-GB" sz="4800" i="1" dirty="0">
+                <a:solidFill>
+                  <a:schemeClr val="bg2">
+                    <a:lumMod val="25000"/>
+                  </a:schemeClr>
+                </a:solidFill>
               </a:rPr>
               <a:t>Reassign shorter identifiers in a fully distributed manner</a:t>
             </a:r>
@@ -4267,8 +4271,8 @@
         </p:nvSpPr>
         <p:spPr>
           <a:xfrm>
-            <a:off x="2811168" y="21680955"/>
-            <a:ext cx="15603911" cy="830997"/>
+            <a:off x="2151150" y="21684146"/>
+            <a:ext cx="16911129" cy="923330"/>
           </a:xfrm>
           <a:prstGeom prst="rect">
             <a:avLst/>
@@ -4283,35 +4287,60 @@
           <a:p>
             <a:pPr algn="ctr"/>
             <a:r>
-              <a:rPr lang="en-GB" sz="4400" b="1" dirty="0">
+              <a:rPr lang="en-GB" sz="4800" b="1" i="1" dirty="0">
+                <a:solidFill>
+                  <a:schemeClr val="bg2">
+                    <a:lumMod val="25000"/>
+                  </a:schemeClr>
+                </a:solidFill>
                 <a:latin typeface="Calibri Light" panose="020F0302020204030204" pitchFamily="34" charset="0"/>
                 <a:cs typeface="Calibri Light" panose="020F0302020204030204" pitchFamily="34" charset="0"/>
               </a:rPr>
               <a:t>Propose a fully </a:t>
             </a:r>
             <a:r>
-              <a:rPr lang="en-GB" sz="4800" b="1" dirty="0">
+              <a:rPr lang="en-GB" sz="5400" b="1" i="1" dirty="0">
+                <a:solidFill>
+                  <a:schemeClr val="bg2">
+                    <a:lumMod val="25000"/>
+                  </a:schemeClr>
+                </a:solidFill>
                 <a:latin typeface="Calibri Light" panose="020F0302020204030204" pitchFamily="34" charset="0"/>
                 <a:cs typeface="Calibri Light" panose="020F0302020204030204" pitchFamily="34" charset="0"/>
               </a:rPr>
               <a:t>distributed</a:t>
             </a:r>
             <a:r>
-              <a:rPr lang="en-GB" sz="4400" b="1" dirty="0">
+              <a:rPr lang="en-GB" sz="4800" b="1" i="1" dirty="0">
+                <a:solidFill>
+                  <a:schemeClr val="bg2">
+                    <a:lumMod val="25000"/>
+                  </a:schemeClr>
+                </a:solidFill>
                 <a:latin typeface="Calibri Light" panose="020F0302020204030204" pitchFamily="34" charset="0"/>
                 <a:cs typeface="Calibri Light" panose="020F0302020204030204" pitchFamily="34" charset="0"/>
               </a:rPr>
               <a:t> renaming mechanism for </a:t>
             </a:r>
             <a:r>
-              <a:rPr lang="en-GB" sz="4400" b="1" i="1" dirty="0" err="1">
+              <a:rPr lang="en-GB" sz="4800" b="1" i="1" dirty="0" err="1">
+                <a:solidFill>
+                  <a:schemeClr val="bg2">
+                    <a:lumMod val="25000"/>
+                  </a:schemeClr>
+                </a:solidFill>
                 <a:latin typeface="Calibri Light" panose="020F0302020204030204" pitchFamily="34" charset="0"/>
                 <a:cs typeface="Calibri Light" panose="020F0302020204030204" pitchFamily="34" charset="0"/>
               </a:rPr>
               <a:t>LogootSplit</a:t>
             </a:r>
             <a:r>
-              <a:rPr lang="en-GB" sz="4400" b="1" dirty="0">
+              <a:rPr lang="en-GB" sz="4800" b="1" i="1" dirty="0">
+                <a:solidFill>
+                  <a:schemeClr val="bg2">
+                    <a:lumMod val="25000"/>
+                  </a:schemeClr>
+                </a:solidFill>
                 <a:latin typeface="Calibri Light" panose="020F0302020204030204" pitchFamily="34" charset="0"/>
                 <a:cs typeface="Calibri Light" panose="020F0302020204030204" pitchFamily="34" charset="0"/>
               </a:rPr>
@@ -5179,7 +5208,7 @@
         </p:blipFill>
         <p:spPr>
           <a:xfrm>
-            <a:off x="10176032" y="22823708"/>
+            <a:off x="10133502" y="22823708"/>
             <a:ext cx="923268" cy="923268"/>
           </a:xfrm>
           <a:prstGeom prst="rect">
@@ -5241,17 +5270,21 @@
             <a:ext cx="746284" cy="2562667"/>
           </a:xfrm>
           <a:prstGeom prst="rightBrace">
-            <a:avLst/>
+            <a:avLst>
+              <a:gd name="adj1" fmla="val 55226"/>
+              <a:gd name="adj2" fmla="val 50000"/>
+            </a:avLst>
           </a:prstGeom>
+          <a:ln w="19050"/>
         </p:spPr>
         <p:style>
-          <a:lnRef idx="1">
+          <a:lnRef idx="2">
             <a:schemeClr val="accent2"/>
           </a:lnRef>
           <a:fillRef idx="0">
             <a:schemeClr val="accent2"/>
           </a:fillRef>
-          <a:effectRef idx="0">
+          <a:effectRef idx="1">
             <a:schemeClr val="accent2"/>
           </a:effectRef>
           <a:fontRef idx="minor">
@@ -5565,7 +5598,7 @@
         </p:nvSpPr>
         <p:spPr>
           <a:xfrm>
-            <a:off x="8083498" y="23959480"/>
+            <a:off x="8040968" y="23959480"/>
             <a:ext cx="5086098" cy="2179571"/>
           </a:xfrm>
           <a:prstGeom prst="rect">

</xml_diff>